<commit_message>
Deploy website Mon Feb 26 13:48:42 PST 2024
</commit_message>
<xml_diff>
--- a/assets/slides/sp24/10-ADTs.pptx
+++ b/assets/slides/sp24/10-ADTs.pptx
@@ -5,76 +5,77 @@
     <p:sldMasterId id="2147483690" r:id="rId1"/>
   </p:sldMasterIdLst>
   <p:notesMasterIdLst>
-    <p:notesMasterId r:id="rId23"/>
+    <p:notesMasterId r:id="rId24"/>
   </p:notesMasterIdLst>
   <p:sldIdLst>
     <p:sldId id="423" r:id="rId2"/>
-    <p:sldId id="308" r:id="rId3"/>
-    <p:sldId id="299" r:id="rId4"/>
-    <p:sldId id="314" r:id="rId5"/>
-    <p:sldId id="303" r:id="rId6"/>
-    <p:sldId id="307" r:id="rId7"/>
-    <p:sldId id="312" r:id="rId8"/>
-    <p:sldId id="290" r:id="rId9"/>
-    <p:sldId id="418" r:id="rId10"/>
-    <p:sldId id="414" r:id="rId11"/>
-    <p:sldId id="410" r:id="rId12"/>
-    <p:sldId id="264" r:id="rId13"/>
-    <p:sldId id="280" r:id="rId14"/>
-    <p:sldId id="265" r:id="rId15"/>
-    <p:sldId id="412" r:id="rId16"/>
-    <p:sldId id="281" r:id="rId17"/>
-    <p:sldId id="422" r:id="rId18"/>
-    <p:sldId id="413" r:id="rId19"/>
-    <p:sldId id="270" r:id="rId20"/>
-    <p:sldId id="271" r:id="rId21"/>
-    <p:sldId id="417" r:id="rId22"/>
+    <p:sldId id="424" r:id="rId3"/>
+    <p:sldId id="308" r:id="rId4"/>
+    <p:sldId id="299" r:id="rId5"/>
+    <p:sldId id="314" r:id="rId6"/>
+    <p:sldId id="303" r:id="rId7"/>
+    <p:sldId id="307" r:id="rId8"/>
+    <p:sldId id="312" r:id="rId9"/>
+    <p:sldId id="290" r:id="rId10"/>
+    <p:sldId id="418" r:id="rId11"/>
+    <p:sldId id="414" r:id="rId12"/>
+    <p:sldId id="410" r:id="rId13"/>
+    <p:sldId id="264" r:id="rId14"/>
+    <p:sldId id="280" r:id="rId15"/>
+    <p:sldId id="265" r:id="rId16"/>
+    <p:sldId id="412" r:id="rId17"/>
+    <p:sldId id="281" r:id="rId18"/>
+    <p:sldId id="422" r:id="rId19"/>
+    <p:sldId id="413" r:id="rId20"/>
+    <p:sldId id="270" r:id="rId21"/>
+    <p:sldId id="271" r:id="rId22"/>
+    <p:sldId id="417" r:id="rId23"/>
   </p:sldIdLst>
   <p:sldSz cx="12192000" cy="6858000"/>
   <p:notesSz cx="6997700" cy="9194800"/>
   <p:embeddedFontLst>
     <p:embeddedFont>
       <p:font typeface="Courier" panose="02070309020205020404" pitchFamily="49" charset="0"/>
-      <p:regular r:id="rId24"/>
-      <p:bold r:id="rId25"/>
-      <p:italic r:id="rId26"/>
-      <p:boldItalic r:id="rId27"/>
+      <p:regular r:id="rId25"/>
+      <p:bold r:id="rId26"/>
+      <p:italic r:id="rId27"/>
+      <p:boldItalic r:id="rId28"/>
     </p:embeddedFont>
     <p:embeddedFont>
       <p:font typeface="FreightMicro Pro Book"/>
-      <p:regular r:id="rId28"/>
-      <p:italic r:id="rId29"/>
+      <p:regular r:id="rId29"/>
+      <p:italic r:id="rId30"/>
     </p:embeddedFont>
     <p:embeddedFont>
       <p:font typeface="FreightSans Pro Medium" panose="020F0502020204030204" pitchFamily="34" charset="0"/>
-      <p:regular r:id="rId30"/>
-      <p:bold r:id="rId31"/>
-      <p:italic r:id="rId32"/>
-      <p:boldItalic r:id="rId33"/>
+      <p:regular r:id="rId31"/>
+      <p:bold r:id="rId32"/>
+      <p:italic r:id="rId33"/>
+      <p:boldItalic r:id="rId34"/>
     </p:embeddedFont>
     <p:embeddedFont>
       <p:font typeface="Open Sans" pitchFamily="2" charset="0"/>
-      <p:regular r:id="rId34"/>
-      <p:bold r:id="rId35"/>
-      <p:italic r:id="rId36"/>
-      <p:boldItalic r:id="rId37"/>
+      <p:regular r:id="rId35"/>
+      <p:bold r:id="rId36"/>
+      <p:italic r:id="rId37"/>
+      <p:boldItalic r:id="rId38"/>
     </p:embeddedFont>
     <p:embeddedFont>
       <p:font typeface="Open Sans Light" pitchFamily="2" charset="0"/>
-      <p:regular r:id="rId38"/>
-      <p:italic r:id="rId39"/>
+      <p:regular r:id="rId39"/>
+      <p:italic r:id="rId40"/>
     </p:embeddedFont>
     <p:embeddedFont>
       <p:font typeface="Source Code Pro" panose="020B0309030403020204" pitchFamily="34" charset="0"/>
-      <p:regular r:id="rId40"/>
-      <p:bold r:id="rId41"/>
-      <p:italic r:id="rId42"/>
-      <p:boldItalic r:id="rId43"/>
+      <p:regular r:id="rId41"/>
+      <p:bold r:id="rId42"/>
+      <p:italic r:id="rId43"/>
+      <p:boldItalic r:id="rId44"/>
     </p:embeddedFont>
     <p:embeddedFont>
       <p:font typeface="Source Code Pro Medium" panose="020B0309030403020204" pitchFamily="34" charset="0"/>
-      <p:regular r:id="rId44"/>
-      <p:italic r:id="rId45"/>
+      <p:regular r:id="rId45"/>
+      <p:italic r:id="rId46"/>
     </p:embeddedFont>
   </p:embeddedFontLst>
   <p:defaultTextStyle>
@@ -1778,7 +1779,7 @@
                 <a:latin typeface="Times New Roman" charset="0"/>
               </a:rPr>
               <a:pPr/>
-              <a:t>2</a:t>
+              <a:t>3</a:t>
             </a:fld>
             <a:endParaRPr lang="en-US" sz="900">
               <a:latin typeface="Times New Roman" charset="0"/>
@@ -2061,7 +2062,7 @@
                 <a:cs typeface="Times New Roman"/>
                 <a:sym typeface="Times New Roman"/>
               </a:rPr>
-              <a:t>6</a:t>
+              <a:t>7</a:t>
             </a:fld>
             <a:endParaRPr lang="en-US" sz="900" b="0" i="1" u="none" strike="noStrike" cap="none">
               <a:solidFill>
@@ -2170,7 +2171,7 @@
                 <a:cs typeface="Times New Roman"/>
                 <a:sym typeface="Times New Roman"/>
               </a:rPr>
-              <a:t>7</a:t>
+              <a:t>8</a:t>
             </a:fld>
             <a:endParaRPr lang="en-US" sz="900" b="0" i="1" u="none" strike="noStrike" cap="none">
               <a:solidFill>
@@ -2363,7 +2364,7 @@
                 <a:latin typeface="Open Sans Light" panose="020B0606030504020204" pitchFamily="34" charset="0"/>
               </a:rPr>
               <a:pPr/>
-              <a:t>8</a:t>
+              <a:t>9</a:t>
             </a:fld>
             <a:endParaRPr lang="en-US" sz="900" dirty="0">
               <a:latin typeface="Open Sans Light" panose="020B0606030504020204" pitchFamily="34" charset="0"/>
@@ -11201,52 +11202,28 @@
                 <a:ea typeface="Open Sans Light" pitchFamily="2" charset="0"/>
                 <a:cs typeface="Open Sans Light" pitchFamily="2" charset="0"/>
               </a:rPr>
-              <a:t> to</a:t>
-            </a:r>
+              <a:t> to fail.</a:t>
+            </a:r>
+          </a:p>
+          <a:p>
             <a:r>
               <a:rPr lang="en-US" dirty="0">
                 <a:latin typeface="Open Sans Light" pitchFamily="2" charset="0"/>
                 <a:ea typeface="Open Sans Light" pitchFamily="2" charset="0"/>
                 <a:cs typeface="Open Sans Light" pitchFamily="2" charset="0"/>
               </a:rPr>
-              <a:t> fail.</a:t>
-            </a:r>
-          </a:p>
-          <a:p>
+              <a:t> Today:</a:t>
+            </a:r>
+          </a:p>
+          <a:p>
+            <a:pPr lvl="1"/>
             <a:r>
               <a:rPr lang="en-US" dirty="0">
                 <a:latin typeface="Open Sans Light" pitchFamily="2" charset="0"/>
                 <a:ea typeface="Open Sans Light" pitchFamily="2" charset="0"/>
                 <a:cs typeface="Open Sans Light" pitchFamily="2" charset="0"/>
               </a:rPr>
-              <a:t> Today:</a:t>
-            </a:r>
-          </a:p>
-          <a:p>
-            <a:pPr lvl="1"/>
-            <a:r>
-              <a:rPr lang="en-US" dirty="0">
-                <a:latin typeface="Open Sans Light" pitchFamily="2" charset="0"/>
-                <a:ea typeface="Open Sans Light" pitchFamily="2" charset="0"/>
-                <a:cs typeface="Open Sans Light" pitchFamily="2" charset="0"/>
-              </a:rPr>
-              <a:t> Wrap</a:t>
-            </a:r>
-            <a:r>
-              <a:rPr lang="en-US" dirty="0">
-                <a:latin typeface="Open Sans Light" pitchFamily="2" charset="0"/>
-                <a:ea typeface="Open Sans Light" pitchFamily="2" charset="0"/>
-                <a:cs typeface="Open Sans Light" pitchFamily="2" charset="0"/>
-              </a:rPr>
-              <a:t> </a:t>
-            </a:r>
-            <a:r>
-              <a:rPr lang="en-US" dirty="0">
-                <a:latin typeface="Open Sans Light" pitchFamily="2" charset="0"/>
-                <a:ea typeface="Open Sans Light" pitchFamily="2" charset="0"/>
-                <a:cs typeface="Open Sans Light" pitchFamily="2" charset="0"/>
-              </a:rPr>
-              <a:t>up 1 mutable data example, then ADTs</a:t>
+              <a:t> Wrap up 1 mutable data example, then ADTs</a:t>
             </a:r>
           </a:p>
         </p:txBody>
@@ -11319,7 +11296,7 @@
           <p:cNvPr id="2" name="Title 1">
             <a:extLst>
               <a:ext uri="{FF2B5EF4-FFF2-40B4-BE49-F238E27FC236}">
-                <a16:creationId xmlns:a16="http://schemas.microsoft.com/office/drawing/2014/main" id="{36B6195A-9A97-B04A-B6C0-EF95068317AB}"/>
+                <a16:creationId xmlns:a16="http://schemas.microsoft.com/office/drawing/2014/main" id="{EB14EB12-0C9F-3746-854D-651CEBFE86CE}"/>
               </a:ext>
             </a:extLst>
           </p:cNvPr>
@@ -11337,17 +11314,17 @@
           <a:p>
             <a:r>
               <a:rPr lang="en-US" sz="3600" dirty="0"/>
-              <a:t>Creating Abstractions</a:t>
-            </a:r>
-          </a:p>
-        </p:txBody>
-      </p:sp>
-      <p:sp>
-        <p:nvSpPr>
-          <p:cNvPr id="3" name="Text Placeholder 2">
+              <a:t>Abstract Data Type</a:t>
+            </a:r>
+          </a:p>
+        </p:txBody>
+      </p:sp>
+      <p:sp>
+        <p:nvSpPr>
+          <p:cNvPr id="3" name="Content Placeholder 2">
             <a:extLst>
               <a:ext uri="{FF2B5EF4-FFF2-40B4-BE49-F238E27FC236}">
-                <a16:creationId xmlns:a16="http://schemas.microsoft.com/office/drawing/2014/main" id="{8D8B326C-C421-E14D-8661-C40157E05458}"/>
+                <a16:creationId xmlns:a16="http://schemas.microsoft.com/office/drawing/2014/main" id="{D4238813-95CA-8B45-825F-2253C2678B52}"/>
               </a:ext>
             </a:extLst>
           </p:cNvPr>
@@ -11364,91 +11341,45 @@
           <a:lstStyle/>
           <a:p>
             <a:r>
-              <a:rPr lang="en-US" sz="2400" dirty="0"/>
-              <a:t>Compound values combine other values together</a:t>
+              <a:rPr lang="en-US" sz="2600" dirty="0"/>
+              <a:t>Uses pure functions to encapsulate some logic as part of a program.</a:t>
+            </a:r>
+          </a:p>
+          <a:p>
+            <a:r>
+              <a:rPr lang="en-US" sz="2600" dirty="0"/>
+              <a:t>We rely of built-in types (int, str, list, </a:t>
+            </a:r>
+            <a:r>
+              <a:rPr lang="en-US" sz="2600" dirty="0" err="1"/>
+              <a:t>etc</a:t>
+            </a:r>
+            <a:r>
+              <a:rPr lang="en-US" sz="2600" dirty="0"/>
+              <a:t>) to build ADTs</a:t>
+            </a:r>
+          </a:p>
+          <a:p>
+            <a:r>
+              <a:rPr lang="en-US" sz="2600" dirty="0"/>
+              <a:t>This is a contrast to object-oriented programming</a:t>
             </a:r>
           </a:p>
           <a:p>
             <a:pPr lvl="1"/>
             <a:r>
-              <a:rPr lang="en-US" sz="2400" dirty="0"/>
-              <a:t>date: a year, a month, and a day</a:t>
-            </a:r>
-          </a:p>
-          <a:p>
-            <a:pPr lvl="1"/>
-            <a:r>
-              <a:rPr lang="en-US" sz="2400" dirty="0"/>
-              <a:t>geographic position: latitude and longitude</a:t>
-            </a:r>
-          </a:p>
-          <a:p>
-            <a:pPr lvl="1"/>
-            <a:r>
-              <a:rPr lang="en-US" sz="2400" dirty="0"/>
-              <a:t>a game board</a:t>
-            </a:r>
-          </a:p>
-          <a:p>
-            <a:endParaRPr lang="en-US" sz="2400" dirty="0"/>
-          </a:p>
-          <a:p>
-            <a:r>
-              <a:rPr lang="en-US" sz="2400" dirty="0"/>
-              <a:t>Data abstraction lets us manipulate compound values as units</a:t>
-            </a:r>
-          </a:p>
-          <a:p>
-            <a:r>
-              <a:rPr lang="en-US" sz="2400" dirty="0"/>
-              <a:t>Isolate two parts of any program that uses data: </a:t>
-            </a:r>
-          </a:p>
-          <a:p>
-            <a:pPr lvl="1"/>
-            <a:r>
-              <a:rPr lang="en-US" sz="2400" dirty="0"/>
-              <a:t>How data are represented (as parts) </a:t>
-            </a:r>
-          </a:p>
-          <a:p>
-            <a:pPr lvl="1"/>
-            <a:r>
-              <a:rPr lang="en-US" sz="2400" dirty="0"/>
-              <a:t>How data are manipulated (as units) </a:t>
-            </a:r>
-          </a:p>
-          <a:p>
-            <a:r>
-              <a:rPr lang="en-US" sz="2400" b="1" dirty="0"/>
-              <a:t>Data abstraction</a:t>
-            </a:r>
-            <a:r>
-              <a:rPr lang="en-US" sz="2400" dirty="0"/>
-              <a:t>: A methodology by which functions enforce an abstraction barrier between </a:t>
-            </a:r>
-            <a:r>
-              <a:rPr lang="en-US" sz="2400" i="1" dirty="0"/>
-              <a:t>representation </a:t>
-            </a:r>
-            <a:r>
-              <a:rPr lang="en-US" sz="2400" dirty="0"/>
-              <a:t>and </a:t>
-            </a:r>
-            <a:r>
-              <a:rPr lang="en-US" sz="2400" i="1" dirty="0"/>
-              <a:t>use </a:t>
-            </a:r>
-            <a:endParaRPr lang="en-US" sz="2400" dirty="0"/>
-          </a:p>
-        </p:txBody>
-      </p:sp>
-      <p:sp>
-        <p:nvSpPr>
-          <p:cNvPr id="5" name="Footer Placeholder 3">
+              <a:rPr lang="en-US" sz="2600" dirty="0"/>
+              <a:t>Which is coming soon!</a:t>
+            </a:r>
+          </a:p>
+        </p:txBody>
+      </p:sp>
+      <p:sp>
+        <p:nvSpPr>
+          <p:cNvPr id="4" name="Footer Placeholder 3">
             <a:extLst>
               <a:ext uri="{FF2B5EF4-FFF2-40B4-BE49-F238E27FC236}">
-                <a16:creationId xmlns:a16="http://schemas.microsoft.com/office/drawing/2014/main" id="{3CA8D428-E97E-D04F-8E06-51BE950A29D0}"/>
+                <a16:creationId xmlns:a16="http://schemas.microsoft.com/office/drawing/2014/main" id="{71F20023-3C05-44A2-2927-411AD9620C4A}"/>
               </a:ext>
             </a:extLst>
           </p:cNvPr>
@@ -11479,7 +11410,7 @@
     </p:spTree>
     <p:extLst>
       <p:ext uri="{BB962C8B-B14F-4D97-AF65-F5344CB8AC3E}">
-        <p14:creationId xmlns:p14="http://schemas.microsoft.com/office/powerpoint/2010/main" val="1016480092"/>
+        <p14:creationId xmlns:p14="http://schemas.microsoft.com/office/powerpoint/2010/main" val="3290418895"/>
       </p:ext>
     </p:extLst>
   </p:cSld>
@@ -11511,6 +11442,198 @@
           <p:cNvPr id="2" name="Title 1">
             <a:extLst>
               <a:ext uri="{FF2B5EF4-FFF2-40B4-BE49-F238E27FC236}">
+                <a16:creationId xmlns:a16="http://schemas.microsoft.com/office/drawing/2014/main" id="{36B6195A-9A97-B04A-B6C0-EF95068317AB}"/>
+              </a:ext>
+            </a:extLst>
+          </p:cNvPr>
+          <p:cNvSpPr>
+            <a:spLocks noGrp="1"/>
+          </p:cNvSpPr>
+          <p:nvPr>
+            <p:ph type="title"/>
+          </p:nvPr>
+        </p:nvSpPr>
+        <p:spPr/>
+        <p:txBody>
+          <a:bodyPr/>
+          <a:lstStyle/>
+          <a:p>
+            <a:r>
+              <a:rPr lang="en-US" sz="3600" dirty="0"/>
+              <a:t>Creating Abstractions</a:t>
+            </a:r>
+          </a:p>
+        </p:txBody>
+      </p:sp>
+      <p:sp>
+        <p:nvSpPr>
+          <p:cNvPr id="3" name="Text Placeholder 2">
+            <a:extLst>
+              <a:ext uri="{FF2B5EF4-FFF2-40B4-BE49-F238E27FC236}">
+                <a16:creationId xmlns:a16="http://schemas.microsoft.com/office/drawing/2014/main" id="{8D8B326C-C421-E14D-8661-C40157E05458}"/>
+              </a:ext>
+            </a:extLst>
+          </p:cNvPr>
+          <p:cNvSpPr>
+            <a:spLocks noGrp="1"/>
+          </p:cNvSpPr>
+          <p:nvPr>
+            <p:ph idx="1"/>
+          </p:nvPr>
+        </p:nvSpPr>
+        <p:spPr/>
+        <p:txBody>
+          <a:bodyPr/>
+          <a:lstStyle/>
+          <a:p>
+            <a:r>
+              <a:rPr lang="en-US" sz="2400" dirty="0"/>
+              <a:t>Compound values combine other values together</a:t>
+            </a:r>
+          </a:p>
+          <a:p>
+            <a:pPr lvl="1"/>
+            <a:r>
+              <a:rPr lang="en-US" sz="2400" dirty="0"/>
+              <a:t>date: a year, a month, and a day</a:t>
+            </a:r>
+          </a:p>
+          <a:p>
+            <a:pPr lvl="1"/>
+            <a:r>
+              <a:rPr lang="en-US" sz="2400" dirty="0"/>
+              <a:t>geographic position: latitude and longitude</a:t>
+            </a:r>
+          </a:p>
+          <a:p>
+            <a:pPr lvl="1"/>
+            <a:r>
+              <a:rPr lang="en-US" sz="2400" dirty="0"/>
+              <a:t>a game board</a:t>
+            </a:r>
+          </a:p>
+          <a:p>
+            <a:endParaRPr lang="en-US" sz="2400" dirty="0"/>
+          </a:p>
+          <a:p>
+            <a:r>
+              <a:rPr lang="en-US" sz="2400" dirty="0"/>
+              <a:t>Data abstraction lets us manipulate compound values as units</a:t>
+            </a:r>
+          </a:p>
+          <a:p>
+            <a:r>
+              <a:rPr lang="en-US" sz="2400" dirty="0"/>
+              <a:t>Isolate two parts of any program that uses data: </a:t>
+            </a:r>
+          </a:p>
+          <a:p>
+            <a:pPr lvl="1"/>
+            <a:r>
+              <a:rPr lang="en-US" sz="2400" dirty="0"/>
+              <a:t>How data are represented (as parts) </a:t>
+            </a:r>
+          </a:p>
+          <a:p>
+            <a:pPr lvl="1"/>
+            <a:r>
+              <a:rPr lang="en-US" sz="2400" dirty="0"/>
+              <a:t>How data are manipulated (as units) </a:t>
+            </a:r>
+          </a:p>
+          <a:p>
+            <a:r>
+              <a:rPr lang="en-US" sz="2400" b="1" dirty="0"/>
+              <a:t>Data abstraction</a:t>
+            </a:r>
+            <a:r>
+              <a:rPr lang="en-US" sz="2400" dirty="0"/>
+              <a:t>: A methodology by which functions enforce an abstraction barrier between </a:t>
+            </a:r>
+            <a:r>
+              <a:rPr lang="en-US" sz="2400" i="1" dirty="0"/>
+              <a:t>representation </a:t>
+            </a:r>
+            <a:r>
+              <a:rPr lang="en-US" sz="2400" dirty="0"/>
+              <a:t>and </a:t>
+            </a:r>
+            <a:r>
+              <a:rPr lang="en-US" sz="2400" i="1" dirty="0"/>
+              <a:t>use </a:t>
+            </a:r>
+            <a:endParaRPr lang="en-US" sz="2400" dirty="0"/>
+          </a:p>
+        </p:txBody>
+      </p:sp>
+      <p:sp>
+        <p:nvSpPr>
+          <p:cNvPr id="5" name="Footer Placeholder 3">
+            <a:extLst>
+              <a:ext uri="{FF2B5EF4-FFF2-40B4-BE49-F238E27FC236}">
+                <a16:creationId xmlns:a16="http://schemas.microsoft.com/office/drawing/2014/main" id="{3CA8D428-E97E-D04F-8E06-51BE950A29D0}"/>
+              </a:ext>
+            </a:extLst>
+          </p:cNvPr>
+          <p:cNvSpPr>
+            <a:spLocks noGrp="1"/>
+          </p:cNvSpPr>
+          <p:nvPr>
+            <p:ph type="ftr" sz="quarter" idx="10"/>
+          </p:nvPr>
+        </p:nvSpPr>
+        <p:spPr>
+          <a:xfrm>
+            <a:off x="4038599" y="6356350"/>
+            <a:ext cx="4593771" cy="365125"/>
+          </a:xfrm>
+        </p:spPr>
+        <p:txBody>
+          <a:bodyPr/>
+          <a:lstStyle/>
+          <a:p>
+            <a:r>
+              <a:rPr lang="en-US" dirty="0"/>
+              <a:t>Michael Ball | UC Berkeley | https://c88c.org | © CC BY-NC-SA</a:t>
+            </a:r>
+          </a:p>
+        </p:txBody>
+      </p:sp>
+    </p:spTree>
+    <p:extLst>
+      <p:ext uri="{BB962C8B-B14F-4D97-AF65-F5344CB8AC3E}">
+        <p14:creationId xmlns:p14="http://schemas.microsoft.com/office/powerpoint/2010/main" val="1016480092"/>
+      </p:ext>
+    </p:extLst>
+  </p:cSld>
+  <p:clrMapOvr>
+    <a:masterClrMapping/>
+  </p:clrMapOvr>
+</p:sld>
+</file>
+
+<file path=ppt/slides/slide12.xml><?xml version="1.0" encoding="utf-8"?>
+<p:sld xmlns:a="http://schemas.openxmlformats.org/drawingml/2006/main" xmlns:r="http://schemas.openxmlformats.org/officeDocument/2006/relationships" xmlns:p="http://schemas.openxmlformats.org/presentationml/2006/main">
+  <p:cSld>
+    <p:spTree>
+      <p:nvGrpSpPr>
+        <p:cNvPr id="1" name=""/>
+        <p:cNvGrpSpPr/>
+        <p:nvPr/>
+      </p:nvGrpSpPr>
+      <p:grpSpPr>
+        <a:xfrm>
+          <a:off x="0" y="0"/>
+          <a:ext cx="0" cy="0"/>
+          <a:chOff x="0" y="0"/>
+          <a:chExt cx="0" cy="0"/>
+        </a:xfrm>
+      </p:grpSpPr>
+      <p:sp>
+        <p:nvSpPr>
+          <p:cNvPr id="2" name="Title 1">
+            <a:extLst>
+              <a:ext uri="{FF2B5EF4-FFF2-40B4-BE49-F238E27FC236}">
                 <a16:creationId xmlns:a16="http://schemas.microsoft.com/office/drawing/2014/main" id="{0304CCEA-ABE1-994B-9C87-AE7A1DFBB9AD}"/>
               </a:ext>
             </a:extLst>
@@ -11674,7 +11797,7 @@
 </p:sld>
 </file>
 
-<file path=ppt/slides/slide12.xml><?xml version="1.0" encoding="utf-8"?>
+<file path=ppt/slides/slide13.xml><?xml version="1.0" encoding="utf-8"?>
 <p:sld xmlns:a="http://schemas.openxmlformats.org/drawingml/2006/main" xmlns:r="http://schemas.openxmlformats.org/officeDocument/2006/relationships" xmlns:p="http://schemas.openxmlformats.org/presentationml/2006/main">
   <p:cSld>
     <p:spTree>
@@ -12511,7 +12634,7 @@
 </p:sld>
 </file>
 
-<file path=ppt/slides/slide13.xml><?xml version="1.0" encoding="utf-8"?>
+<file path=ppt/slides/slide14.xml><?xml version="1.0" encoding="utf-8"?>
 <p:sld xmlns:a="http://schemas.openxmlformats.org/drawingml/2006/main" xmlns:r="http://schemas.openxmlformats.org/officeDocument/2006/relationships" xmlns:p="http://schemas.openxmlformats.org/presentationml/2006/main">
   <p:cSld>
     <p:spTree>
@@ -13260,7 +13383,7 @@
 </p:sld>
 </file>
 
-<file path=ppt/slides/slide14.xml><?xml version="1.0" encoding="utf-8"?>
+<file path=ppt/slides/slide15.xml><?xml version="1.0" encoding="utf-8"?>
 <p:sld xmlns:a="http://schemas.openxmlformats.org/drawingml/2006/main" xmlns:r="http://schemas.openxmlformats.org/officeDocument/2006/relationships" xmlns:p="http://schemas.openxmlformats.org/presentationml/2006/main">
   <p:cSld>
     <p:spTree>
@@ -13520,7 +13643,7 @@
 </p:sld>
 </file>
 
-<file path=ppt/slides/slide15.xml><?xml version="1.0" encoding="utf-8"?>
+<file path=ppt/slides/slide16.xml><?xml version="1.0" encoding="utf-8"?>
 <p:sld xmlns:a="http://schemas.openxmlformats.org/drawingml/2006/main" xmlns:r="http://schemas.openxmlformats.org/officeDocument/2006/relationships" xmlns:p="http://schemas.openxmlformats.org/presentationml/2006/main">
   <p:cSld>
     <p:spTree>
@@ -13801,7 +13924,7 @@
 </p:sld>
 </file>
 
-<file path=ppt/slides/slide16.xml><?xml version="1.0" encoding="utf-8"?>
+<file path=ppt/slides/slide17.xml><?xml version="1.0" encoding="utf-8"?>
 <p:sld xmlns:a="http://schemas.openxmlformats.org/drawingml/2006/main" xmlns:r="http://schemas.openxmlformats.org/officeDocument/2006/relationships" xmlns:p="http://schemas.openxmlformats.org/presentationml/2006/main">
   <p:cSld>
     <p:spTree>
@@ -13989,7 +14112,7 @@
 </p:sld>
 </file>
 
-<file path=ppt/slides/slide17.xml><?xml version="1.0" encoding="utf-8"?>
+<file path=ppt/slides/slide18.xml><?xml version="1.0" encoding="utf-8"?>
 <p:sld xmlns:a="http://schemas.openxmlformats.org/drawingml/2006/main" xmlns:r="http://schemas.openxmlformats.org/officeDocument/2006/relationships" xmlns:p="http://schemas.openxmlformats.org/presentationml/2006/main">
   <p:cSld>
     <p:spTree>
@@ -14149,7 +14272,7 @@
 </p:sld>
 </file>
 
-<file path=ppt/slides/slide18.xml><?xml version="1.0" encoding="utf-8"?>
+<file path=ppt/slides/slide19.xml><?xml version="1.0" encoding="utf-8"?>
 <p:sld xmlns:a="http://schemas.openxmlformats.org/drawingml/2006/main" xmlns:r="http://schemas.openxmlformats.org/officeDocument/2006/relationships" xmlns:p="http://schemas.openxmlformats.org/presentationml/2006/main" show="0">
   <p:cSld>
     <p:spTree>
@@ -14319,7 +14442,7 @@
                 <a:cs typeface="Open Sans Light" panose="020B0606030504020204" pitchFamily="34" charset="0"/>
               </a:rPr>
               <a:pPr algn="r"/>
-              <a:t>18</a:t>
+              <a:t>19</a:t>
             </a:fld>
             <a:endParaRPr lang="en-US" dirty="0">
               <a:latin typeface="Open Sans Light" panose="020B0606030504020204" pitchFamily="34" charset="0"/>
@@ -14402,209 +14525,6 @@
     <p:extLst>
       <p:ext uri="{BB962C8B-B14F-4D97-AF65-F5344CB8AC3E}">
         <p14:creationId xmlns:p14="http://schemas.microsoft.com/office/powerpoint/2010/main" val="3623810552"/>
-      </p:ext>
-    </p:extLst>
-  </p:cSld>
-  <p:clrMapOvr>
-    <a:masterClrMapping/>
-  </p:clrMapOvr>
-</p:sld>
-</file>
-
-<file path=ppt/slides/slide19.xml><?xml version="1.0" encoding="utf-8"?>
-<p:sld xmlns:a="http://schemas.openxmlformats.org/drawingml/2006/main" xmlns:r="http://schemas.openxmlformats.org/officeDocument/2006/relationships" xmlns:p="http://schemas.openxmlformats.org/presentationml/2006/main">
-  <p:cSld>
-    <p:spTree>
-      <p:nvGrpSpPr>
-        <p:cNvPr id="1" name="Shape 270"/>
-        <p:cNvGrpSpPr/>
-        <p:nvPr/>
-      </p:nvGrpSpPr>
-      <p:grpSpPr>
-        <a:xfrm>
-          <a:off x="0" y="0"/>
-          <a:ext cx="0" cy="0"/>
-          <a:chOff x="0" y="0"/>
-          <a:chExt cx="0" cy="0"/>
-        </a:xfrm>
-      </p:grpSpPr>
-      <p:sp>
-        <p:nvSpPr>
-          <p:cNvPr id="5" name="Title 4">
-            <a:extLst>
-              <a:ext uri="{FF2B5EF4-FFF2-40B4-BE49-F238E27FC236}">
-                <a16:creationId xmlns:a16="http://schemas.microsoft.com/office/drawing/2014/main" id="{32BA3C90-1DEE-76C6-ED11-3D620381F05F}"/>
-              </a:ext>
-            </a:extLst>
-          </p:cNvPr>
-          <p:cNvSpPr>
-            <a:spLocks noGrp="1"/>
-          </p:cNvSpPr>
-          <p:nvPr>
-            <p:ph type="title"/>
-          </p:nvPr>
-        </p:nvSpPr>
-        <p:spPr/>
-        <p:txBody>
-          <a:bodyPr/>
-          <a:lstStyle/>
-          <a:p>
-            <a:r>
-              <a:rPr lang="en-US">
-                <a:sym typeface="Arial"/>
-              </a:rPr>
-              <a:t>A Layered Design Process – Button Up</a:t>
-            </a:r>
-            <a:endParaRPr lang="en-US"/>
-          </a:p>
-        </p:txBody>
-      </p:sp>
-      <p:sp>
-        <p:nvSpPr>
-          <p:cNvPr id="272" name="Google Shape;272;p26"/>
-          <p:cNvSpPr txBox="1">
-            <a:spLocks noGrp="1"/>
-          </p:cNvSpPr>
-          <p:nvPr>
-            <p:ph idx="1"/>
-          </p:nvPr>
-        </p:nvSpPr>
-        <p:spPr>
-          <a:xfrm>
-            <a:off x="533400" y="1066800"/>
-            <a:ext cx="11218333" cy="5257800"/>
-          </a:xfrm>
-          <a:noFill/>
-          <a:ln>
-            <a:noFill/>
-          </a:ln>
-        </p:spPr>
-        <p:txBody>
-          <a:bodyPr spcFirstLastPara="1" vert="horz" wrap="square" lIns="92075" tIns="46025" rIns="92075" bIns="46025" numCol="1" anchor="t" anchorCtr="0" compatLnSpc="1">
-            <a:prstTxWarp prst="textNoShape">
-              <a:avLst/>
-            </a:prstTxWarp>
-            <a:noAutofit/>
-          </a:bodyPr>
-          <a:lstStyle/>
-          <a:p>
-            <a:r>
-              <a:rPr lang="en-US" dirty="0">
-                <a:sym typeface="Arial"/>
-              </a:rPr>
-              <a:t>Start with "What do you want to do?"</a:t>
-            </a:r>
-          </a:p>
-          <a:p>
-            <a:r>
-              <a:rPr lang="en-US" dirty="0">
-                <a:sym typeface="Arial"/>
-              </a:rPr>
-              <a:t>Build the application based entirely on the ADT interface</a:t>
-            </a:r>
-            <a:endParaRPr lang="en-US" dirty="0"/>
-          </a:p>
-          <a:p>
-            <a:pPr lvl="1"/>
-            <a:r>
-              <a:rPr lang="en-US" dirty="0">
-                <a:sym typeface="Arial"/>
-              </a:rPr>
-              <a:t>Focus first on Operations, then Constructors and Selectors</a:t>
-            </a:r>
-          </a:p>
-          <a:p>
-            <a:pPr lvl="1"/>
-            <a:r>
-              <a:rPr lang="en-US" dirty="0">
-                <a:sym typeface="Arial"/>
-              </a:rPr>
-              <a:t>Do not implement them! Your program won't work.</a:t>
-            </a:r>
-          </a:p>
-          <a:p>
-            <a:pPr lvl="1"/>
-            <a:r>
-              <a:rPr lang="en-US" dirty="0">
-                <a:sym typeface="Arial"/>
-              </a:rPr>
-              <a:t>You want to capture the "user's" point of view</a:t>
-            </a:r>
-            <a:endParaRPr lang="en-US" dirty="0"/>
-          </a:p>
-          <a:p>
-            <a:r>
-              <a:rPr lang="en-US" dirty="0">
-                <a:sym typeface="Arial"/>
-              </a:rPr>
-              <a:t>Build the operations in ADT on Constructors and Selectors</a:t>
-            </a:r>
-            <a:endParaRPr lang="en-US" dirty="0"/>
-          </a:p>
-          <a:p>
-            <a:pPr lvl="1"/>
-            <a:r>
-              <a:rPr lang="en-US" dirty="0">
-                <a:sym typeface="Arial"/>
-              </a:rPr>
-              <a:t>Not the implementation representation</a:t>
-            </a:r>
-          </a:p>
-          <a:p>
-            <a:pPr lvl="1"/>
-            <a:r>
-              <a:rPr lang="en-US" dirty="0"/>
-              <a:t>This is the end of the abstraction barrier.</a:t>
-            </a:r>
-          </a:p>
-          <a:p>
-            <a:r>
-              <a:rPr lang="en-US" dirty="0">
-                <a:sym typeface="Arial"/>
-              </a:rPr>
-              <a:t>Build the constructors and selectors on some concrete representation</a:t>
-            </a:r>
-            <a:endParaRPr lang="en-US" dirty="0"/>
-          </a:p>
-        </p:txBody>
-      </p:sp>
-      <p:sp>
-        <p:nvSpPr>
-          <p:cNvPr id="2" name="Footer Placeholder 3">
-            <a:extLst>
-              <a:ext uri="{FF2B5EF4-FFF2-40B4-BE49-F238E27FC236}">
-                <a16:creationId xmlns:a16="http://schemas.microsoft.com/office/drawing/2014/main" id="{44308FD6-E7AC-35C3-97EE-51B95361F07D}"/>
-              </a:ext>
-            </a:extLst>
-          </p:cNvPr>
-          <p:cNvSpPr>
-            <a:spLocks noGrp="1"/>
-          </p:cNvSpPr>
-          <p:nvPr>
-            <p:ph type="ftr" sz="quarter" idx="10"/>
-          </p:nvPr>
-        </p:nvSpPr>
-        <p:spPr>
-          <a:xfrm>
-            <a:off x="4038600" y="6434666"/>
-            <a:ext cx="4572000" cy="303743"/>
-          </a:xfrm>
-        </p:spPr>
-        <p:txBody>
-          <a:bodyPr/>
-          <a:lstStyle/>
-          <a:p>
-            <a:r>
-              <a:rPr lang="en-US" dirty="0"/>
-              <a:t>Michael Ball | UC Berkeley | https://c88c.org | © CC BY-NC-SA</a:t>
-            </a:r>
-          </a:p>
-        </p:txBody>
-      </p:sp>
-    </p:spTree>
-    <p:extLst>
-      <p:ext uri="{BB962C8B-B14F-4D97-AF65-F5344CB8AC3E}">
-        <p14:creationId xmlns:p14="http://schemas.microsoft.com/office/powerpoint/2010/main" val="2381109446"/>
       </p:ext>
     </p:extLst>
   </p:cSld>
@@ -14633,10 +14553,10 @@
       </p:grpSpPr>
       <p:sp>
         <p:nvSpPr>
-          <p:cNvPr id="11" name="Title 10">
+          <p:cNvPr id="5" name="Title 4">
             <a:extLst>
               <a:ext uri="{FF2B5EF4-FFF2-40B4-BE49-F238E27FC236}">
-                <a16:creationId xmlns:a16="http://schemas.microsoft.com/office/drawing/2014/main" id="{9187EE84-7023-8A4E-8268-919ABBCBE6E7}"/>
+                <a16:creationId xmlns:a16="http://schemas.microsoft.com/office/drawing/2014/main" id="{BE25434B-A85C-C3F8-83E3-F45234939944}"/>
               </a:ext>
             </a:extLst>
           </p:cNvPr>
@@ -14644,17 +14564,183 @@
             <a:spLocks noGrp="1"/>
           </p:cNvSpPr>
           <p:nvPr>
-            <p:ph type="ctrTitle"/>
-          </p:nvPr>
-        </p:nvSpPr>
-        <p:spPr/>
-        <p:txBody>
-          <a:bodyPr/>
+            <p:ph type="title"/>
+          </p:nvPr>
+        </p:nvSpPr>
+        <p:spPr>
+          <a:xfrm>
+            <a:off x="0" y="0"/>
+            <a:ext cx="12192000" cy="914400"/>
+          </a:xfrm>
+        </p:spPr>
+        <p:txBody>
+          <a:bodyPr wrap="square" anchor="ctr">
+            <a:normAutofit/>
+          </a:bodyPr>
           <a:lstStyle/>
           <a:p>
             <a:r>
+              <a:rPr lang="en-US"/>
+              <a:t>Human Diversity Survey Yields Undiscovered Genetic Variants</a:t>
+            </a:r>
+            <a:endParaRPr lang="en-US" dirty="0"/>
+          </a:p>
+        </p:txBody>
+      </p:sp>
+      <p:sp>
+        <p:nvSpPr>
+          <p:cNvPr id="6" name="Text Placeholder 5">
+            <a:extLst>
+              <a:ext uri="{FF2B5EF4-FFF2-40B4-BE49-F238E27FC236}">
+                <a16:creationId xmlns:a16="http://schemas.microsoft.com/office/drawing/2014/main" id="{0ED42DBF-6156-E2FD-A29C-C8FF530BE51C}"/>
+              </a:ext>
+            </a:extLst>
+          </p:cNvPr>
+          <p:cNvSpPr>
+            <a:spLocks noGrp="1"/>
+          </p:cNvSpPr>
+          <p:nvPr>
+            <p:ph sz="half" idx="1"/>
+          </p:nvPr>
+        </p:nvSpPr>
+        <p:spPr>
+          <a:xfrm>
+            <a:off x="371475" y="1066800"/>
+            <a:ext cx="5495925" cy="5257800"/>
+          </a:xfrm>
+        </p:spPr>
+        <p:txBody>
+          <a:bodyPr wrap="square" anchor="t">
+            <a:noAutofit/>
+          </a:bodyPr>
+          <a:lstStyle/>
+          <a:p>
+            <a:pPr marL="0" indent="0">
+              <a:lnSpc>
+                <a:spcPct val="90000"/>
+              </a:lnSpc>
+              <a:buNone/>
+            </a:pPr>
+            <a:r>
+              <a:rPr lang="en-US" dirty="0">
+                <a:hlinkClick r:id="rId2"/>
+              </a:rPr>
+              <a:t>Nature; Max Kozlov (February 19, 2024)</a:t>
+            </a:r>
+            <a:endParaRPr lang="en-US" dirty="0"/>
+          </a:p>
+          <a:p>
+            <a:pPr marL="0" indent="0">
+              <a:lnSpc>
+                <a:spcPct val="90000"/>
+              </a:lnSpc>
+              <a:buNone/>
+            </a:pPr>
+            <a:endParaRPr lang="en-US" dirty="0"/>
+          </a:p>
+          <a:p>
+            <a:pPr marL="0" indent="0">
+              <a:lnSpc>
+                <a:spcPct val="90000"/>
+              </a:lnSpc>
+              <a:buNone/>
+            </a:pPr>
+            <a:r>
               <a:rPr lang="en-US" dirty="0"/>
-              <a:t>Mutable Functions</a:t>
+              <a:t>Analyses of up to 245,000 genomes from diverse populations in the U.S gathered by the U.S. National Institutes of Health’s All of Us program uncovered more than 275 million new genetic markers. The data will help produce more accurate "polygenic risk scores," which rate a person’s risk of developing a disease as a result of their genetics. To calculate such a score, researchers develop an algorithm trained on the genomic data of people who either do or do not have a particular disease; an individual’s score can then be calculated by feeding their genetic data into the algorithm.</a:t>
+            </a:r>
+          </a:p>
+        </p:txBody>
+      </p:sp>
+      <p:pic>
+        <p:nvPicPr>
+          <p:cNvPr id="1026" name="Picture 2" descr="Distribution of pathogenic, and likely pathogenic ClinVar variants">
+            <a:extLst>
+              <a:ext uri="{FF2B5EF4-FFF2-40B4-BE49-F238E27FC236}">
+                <a16:creationId xmlns:a16="http://schemas.microsoft.com/office/drawing/2014/main" id="{8F2B51D5-8C11-6BEA-3796-1118450479DB}"/>
+              </a:ext>
+            </a:extLst>
+          </p:cNvPr>
+          <p:cNvPicPr>
+            <a:picLocks noGrp="1" noChangeAspect="1" noChangeArrowheads="1"/>
+          </p:cNvPicPr>
+          <p:nvPr>
+            <p:ph sz="half" idx="2"/>
+          </p:nvPr>
+        </p:nvPicPr>
+        <p:blipFill>
+          <a:blip r:embed="rId3">
+            <a:extLst>
+              <a:ext uri="{28A0092B-C50C-407E-A947-70E740481C1C}">
+                <a14:useLocalDpi xmlns:a14="http://schemas.microsoft.com/office/drawing/2010/main" val="0"/>
+              </a:ext>
+            </a:extLst>
+          </a:blip>
+          <a:stretch>
+            <a:fillRect/>
+          </a:stretch>
+        </p:blipFill>
+        <p:spPr bwMode="auto">
+          <a:xfrm>
+            <a:off x="6079672" y="2095499"/>
+            <a:ext cx="5578928" cy="3347357"/>
+          </a:xfrm>
+          <a:prstGeom prst="rect">
+            <a:avLst/>
+          </a:prstGeom>
+          <a:solidFill>
+            <a:srgbClr val="FFFFFF"/>
+          </a:solidFill>
+          <a:extLst>
+            <a:ext uri="{909E8E84-426E-40DD-AFC4-6F175D3DCCD1}">
+              <a14:hiddenFill xmlns:a14="http://schemas.microsoft.com/office/drawing/2010/main">
+                <a:solidFill>
+                  <a:srgbClr val="FFFFFF"/>
+                </a:solidFill>
+              </a14:hiddenFill>
+            </a:ext>
+          </a:extLst>
+        </p:spPr>
+      </p:pic>
+      <p:sp>
+        <p:nvSpPr>
+          <p:cNvPr id="4" name="Footer Placeholder 3">
+            <a:extLst>
+              <a:ext uri="{FF2B5EF4-FFF2-40B4-BE49-F238E27FC236}">
+                <a16:creationId xmlns:a16="http://schemas.microsoft.com/office/drawing/2014/main" id="{82B3E555-2CC6-790B-4AD4-4D5416FD8B6E}"/>
+              </a:ext>
+            </a:extLst>
+          </p:cNvPr>
+          <p:cNvSpPr>
+            <a:spLocks noGrp="1"/>
+          </p:cNvSpPr>
+          <p:nvPr>
+            <p:ph type="ftr" sz="quarter" idx="10"/>
+          </p:nvPr>
+        </p:nvSpPr>
+        <p:spPr>
+          <a:xfrm>
+            <a:off x="4038601" y="6457951"/>
+            <a:ext cx="4348655" cy="256116"/>
+          </a:xfrm>
+        </p:spPr>
+        <p:txBody>
+          <a:bodyPr anchor="ctr">
+            <a:normAutofit lnSpcReduction="10000"/>
+          </a:bodyPr>
+          <a:lstStyle/>
+          <a:p>
+            <a:pPr>
+              <a:lnSpc>
+                <a:spcPct val="90000"/>
+              </a:lnSpc>
+              <a:spcAft>
+                <a:spcPts val="600"/>
+              </a:spcAft>
+            </a:pPr>
+            <a:r>
+              <a:rPr lang="en-US"/>
+              <a:t>Michael Ball | UC Berkeley | https://c88c.org | © CC BY-NC-SA</a:t>
             </a:r>
           </a:p>
         </p:txBody>
@@ -14662,25 +14748,220 @@
     </p:spTree>
     <p:extLst>
       <p:ext uri="{BB962C8B-B14F-4D97-AF65-F5344CB8AC3E}">
-        <p14:creationId xmlns:p14="http://schemas.microsoft.com/office/powerpoint/2010/main" val="3072244520"/>
+        <p14:creationId xmlns:p14="http://schemas.microsoft.com/office/powerpoint/2010/main" val="2673191735"/>
       </p:ext>
     </p:extLst>
   </p:cSld>
   <p:clrMapOvr>
     <a:masterClrMapping/>
   </p:clrMapOvr>
-  <mc:AlternateContent xmlns:mc="http://schemas.openxmlformats.org/markup-compatibility/2006" xmlns:p14="http://schemas.microsoft.com/office/powerpoint/2010/main">
-    <mc:Choice Requires="p14">
-      <p:transition spd="slow" p14:dur="2000" advTm="109658"/>
-    </mc:Choice>
-    <mc:Fallback xmlns="">
-      <p:transition spd="slow" advTm="109658"/>
-    </mc:Fallback>
-  </mc:AlternateContent>
 </p:sld>
 </file>
 
 <file path=ppt/slides/slide20.xml><?xml version="1.0" encoding="utf-8"?>
+<p:sld xmlns:a="http://schemas.openxmlformats.org/drawingml/2006/main" xmlns:r="http://schemas.openxmlformats.org/officeDocument/2006/relationships" xmlns:p="http://schemas.openxmlformats.org/presentationml/2006/main">
+  <p:cSld>
+    <p:spTree>
+      <p:nvGrpSpPr>
+        <p:cNvPr id="1" name="Shape 270"/>
+        <p:cNvGrpSpPr/>
+        <p:nvPr/>
+      </p:nvGrpSpPr>
+      <p:grpSpPr>
+        <a:xfrm>
+          <a:off x="0" y="0"/>
+          <a:ext cx="0" cy="0"/>
+          <a:chOff x="0" y="0"/>
+          <a:chExt cx="0" cy="0"/>
+        </a:xfrm>
+      </p:grpSpPr>
+      <p:sp>
+        <p:nvSpPr>
+          <p:cNvPr id="5" name="Title 4">
+            <a:extLst>
+              <a:ext uri="{FF2B5EF4-FFF2-40B4-BE49-F238E27FC236}">
+                <a16:creationId xmlns:a16="http://schemas.microsoft.com/office/drawing/2014/main" id="{32BA3C90-1DEE-76C6-ED11-3D620381F05F}"/>
+              </a:ext>
+            </a:extLst>
+          </p:cNvPr>
+          <p:cNvSpPr>
+            <a:spLocks noGrp="1"/>
+          </p:cNvSpPr>
+          <p:nvPr>
+            <p:ph type="title"/>
+          </p:nvPr>
+        </p:nvSpPr>
+        <p:spPr/>
+        <p:txBody>
+          <a:bodyPr/>
+          <a:lstStyle/>
+          <a:p>
+            <a:r>
+              <a:rPr lang="en-US" dirty="0">
+                <a:sym typeface="Arial"/>
+              </a:rPr>
+              <a:t>A Layered Design Process – Button Up</a:t>
+            </a:r>
+            <a:endParaRPr lang="en-US" dirty="0"/>
+          </a:p>
+        </p:txBody>
+      </p:sp>
+      <p:sp>
+        <p:nvSpPr>
+          <p:cNvPr id="272" name="Google Shape;272;p26"/>
+          <p:cNvSpPr txBox="1">
+            <a:spLocks noGrp="1"/>
+          </p:cNvSpPr>
+          <p:nvPr>
+            <p:ph idx="1"/>
+          </p:nvPr>
+        </p:nvSpPr>
+        <p:spPr>
+          <a:xfrm>
+            <a:off x="533400" y="1066800"/>
+            <a:ext cx="11218333" cy="5257800"/>
+          </a:xfrm>
+          <a:noFill/>
+          <a:ln>
+            <a:noFill/>
+          </a:ln>
+        </p:spPr>
+        <p:txBody>
+          <a:bodyPr spcFirstLastPara="1" vert="horz" wrap="square" lIns="92075" tIns="46025" rIns="92075" bIns="46025" numCol="1" anchor="t" anchorCtr="0" compatLnSpc="1">
+            <a:prstTxWarp prst="textNoShape">
+              <a:avLst/>
+            </a:prstTxWarp>
+            <a:noAutofit/>
+          </a:bodyPr>
+          <a:lstStyle/>
+          <a:p>
+            <a:r>
+              <a:rPr lang="en-US" dirty="0">
+                <a:sym typeface="Arial"/>
+              </a:rPr>
+              <a:t>Start with "What do you want to do?"</a:t>
+            </a:r>
+          </a:p>
+          <a:p>
+            <a:r>
+              <a:rPr lang="en-US" dirty="0">
+                <a:sym typeface="Arial"/>
+              </a:rPr>
+              <a:t>Build the application based entirely on the ADT interface</a:t>
+            </a:r>
+            <a:endParaRPr lang="en-US" dirty="0"/>
+          </a:p>
+          <a:p>
+            <a:pPr lvl="1"/>
+            <a:r>
+              <a:rPr lang="en-US" dirty="0">
+                <a:sym typeface="Arial"/>
+              </a:rPr>
+              <a:t>Focus first on Operations, then Constructors and Selectors</a:t>
+            </a:r>
+          </a:p>
+          <a:p>
+            <a:pPr lvl="1"/>
+            <a:r>
+              <a:rPr lang="en-US" dirty="0">
+                <a:sym typeface="Arial"/>
+              </a:rPr>
+              <a:t>Do not implement them! Your program won't work.</a:t>
+            </a:r>
+          </a:p>
+          <a:p>
+            <a:pPr lvl="1"/>
+            <a:r>
+              <a:rPr lang="en-US" dirty="0">
+                <a:sym typeface="Arial"/>
+              </a:rPr>
+              <a:t>You want to capture the "user's" point of view</a:t>
+            </a:r>
+            <a:endParaRPr lang="en-US" dirty="0"/>
+          </a:p>
+          <a:p>
+            <a:r>
+              <a:rPr lang="en-US" dirty="0">
+                <a:sym typeface="Arial"/>
+              </a:rPr>
+              <a:t>Build the operations in ADT on Constructors and Selectors</a:t>
+            </a:r>
+            <a:endParaRPr lang="en-US" dirty="0"/>
+          </a:p>
+          <a:p>
+            <a:pPr lvl="1"/>
+            <a:r>
+              <a:rPr lang="en-US" dirty="0">
+                <a:sym typeface="Arial"/>
+              </a:rPr>
+              <a:t>Not the implementation representation</a:t>
+            </a:r>
+          </a:p>
+          <a:p>
+            <a:pPr lvl="1"/>
+            <a:r>
+              <a:rPr lang="en-US" dirty="0"/>
+              <a:t>This is the end of the abstraction barrier.</a:t>
+            </a:r>
+          </a:p>
+          <a:p>
+            <a:r>
+              <a:rPr lang="en-US" dirty="0">
+                <a:sym typeface="Arial"/>
+              </a:rPr>
+              <a:t>Build the constructors and selectors on some concrete representation</a:t>
+            </a:r>
+            <a:endParaRPr lang="en-US" dirty="0"/>
+          </a:p>
+        </p:txBody>
+      </p:sp>
+      <p:sp>
+        <p:nvSpPr>
+          <p:cNvPr id="2" name="Footer Placeholder 3">
+            <a:extLst>
+              <a:ext uri="{FF2B5EF4-FFF2-40B4-BE49-F238E27FC236}">
+                <a16:creationId xmlns:a16="http://schemas.microsoft.com/office/drawing/2014/main" id="{44308FD6-E7AC-35C3-97EE-51B95361F07D}"/>
+              </a:ext>
+            </a:extLst>
+          </p:cNvPr>
+          <p:cNvSpPr>
+            <a:spLocks noGrp="1"/>
+          </p:cNvSpPr>
+          <p:nvPr>
+            <p:ph type="ftr" sz="quarter" idx="10"/>
+          </p:nvPr>
+        </p:nvSpPr>
+        <p:spPr>
+          <a:xfrm>
+            <a:off x="4038600" y="6434666"/>
+            <a:ext cx="4572000" cy="303743"/>
+          </a:xfrm>
+        </p:spPr>
+        <p:txBody>
+          <a:bodyPr/>
+          <a:lstStyle/>
+          <a:p>
+            <a:r>
+              <a:rPr lang="en-US" dirty="0"/>
+              <a:t>Michael Ball | UC Berkeley | https://c88c.org | © CC BY-NC-SA</a:t>
+            </a:r>
+          </a:p>
+        </p:txBody>
+      </p:sp>
+    </p:spTree>
+    <p:extLst>
+      <p:ext uri="{BB962C8B-B14F-4D97-AF65-F5344CB8AC3E}">
+        <p14:creationId xmlns:p14="http://schemas.microsoft.com/office/powerpoint/2010/main" val="2381109446"/>
+      </p:ext>
+    </p:extLst>
+  </p:cSld>
+  <p:clrMapOvr>
+    <a:masterClrMapping/>
+  </p:clrMapOvr>
+</p:sld>
+</file>
+
+<file path=ppt/slides/slide21.xml><?xml version="1.0" encoding="utf-8"?>
 <p:sld xmlns:a="http://schemas.openxmlformats.org/drawingml/2006/main" xmlns:r="http://schemas.openxmlformats.org/officeDocument/2006/relationships" xmlns:p="http://schemas.openxmlformats.org/presentationml/2006/main">
   <p:cSld>
     <p:spTree>
@@ -14849,7 +15130,7 @@
 </p:sld>
 </file>
 
-<file path=ppt/slides/slide21.xml><?xml version="1.0" encoding="utf-8"?>
+<file path=ppt/slides/slide22.xml><?xml version="1.0" encoding="utf-8"?>
 <p:sld xmlns:a="http://schemas.openxmlformats.org/drawingml/2006/main" xmlns:r="http://schemas.openxmlformats.org/officeDocument/2006/relationships" xmlns:p="http://schemas.openxmlformats.org/presentationml/2006/main">
   <p:cSld>
     <p:spTree>
@@ -15091,10 +15372,10 @@
       </p:grpSpPr>
       <p:sp>
         <p:nvSpPr>
-          <p:cNvPr id="2" name="Title 1">
+          <p:cNvPr id="11" name="Title 10">
             <a:extLst>
               <a:ext uri="{FF2B5EF4-FFF2-40B4-BE49-F238E27FC236}">
-                <a16:creationId xmlns:a16="http://schemas.microsoft.com/office/drawing/2014/main" id="{0D223046-645C-9643-8339-A786218BB4F5}"/>
+                <a16:creationId xmlns:a16="http://schemas.microsoft.com/office/drawing/2014/main" id="{9187EE84-7023-8A4E-8268-919ABBCBE6E7}"/>
               </a:ext>
             </a:extLst>
           </p:cNvPr>
@@ -15102,7 +15383,7 @@
             <a:spLocks noGrp="1"/>
           </p:cNvSpPr>
           <p:nvPr>
-            <p:ph type="title"/>
+            <p:ph type="ctrTitle"/>
           </p:nvPr>
         </p:nvSpPr>
         <p:spPr/>
@@ -15112,83 +15393,7 @@
           <a:p>
             <a:r>
               <a:rPr lang="en-US" dirty="0"/>
-              <a:t>Learning Objectives</a:t>
-            </a:r>
-          </a:p>
-        </p:txBody>
-      </p:sp>
-      <p:sp>
-        <p:nvSpPr>
-          <p:cNvPr id="3" name="Content Placeholder 2">
-            <a:extLst>
-              <a:ext uri="{FF2B5EF4-FFF2-40B4-BE49-F238E27FC236}">
-                <a16:creationId xmlns:a16="http://schemas.microsoft.com/office/drawing/2014/main" id="{B2D9456D-4CEC-CF41-8620-FC5EDDA27F80}"/>
-              </a:ext>
-            </a:extLst>
-          </p:cNvPr>
-          <p:cNvSpPr>
-            <a:spLocks noGrp="1"/>
-          </p:cNvSpPr>
-          <p:nvPr>
-            <p:ph idx="1"/>
-          </p:nvPr>
-        </p:nvSpPr>
-        <p:spPr/>
-        <p:txBody>
-          <a:bodyPr/>
-          <a:lstStyle/>
-          <a:p>
-            <a:r>
-              <a:rPr lang="en-US" dirty="0"/>
-              <a:t> Remember: Each function gets its own new frame</a:t>
-            </a:r>
-          </a:p>
-          <a:p>
-            <a:r>
-              <a:rPr lang="en-US" dirty="0"/>
-              <a:t> Inner functions can access data in the parent environment</a:t>
-            </a:r>
-          </a:p>
-          <a:p>
-            <a:r>
-              <a:rPr lang="en-US" dirty="0"/>
-              <a:t> Use an inner function along with a mutable data type to capture changes</a:t>
-            </a:r>
-          </a:p>
-          <a:p>
-            <a:endParaRPr lang="en-US" dirty="0"/>
-          </a:p>
-        </p:txBody>
-      </p:sp>
-      <p:sp>
-        <p:nvSpPr>
-          <p:cNvPr id="4" name="Footer Placeholder 3">
-            <a:extLst>
-              <a:ext uri="{FF2B5EF4-FFF2-40B4-BE49-F238E27FC236}">
-                <a16:creationId xmlns:a16="http://schemas.microsoft.com/office/drawing/2014/main" id="{D187F8E2-3471-52E7-427C-273C7DF57DB7}"/>
-              </a:ext>
-            </a:extLst>
-          </p:cNvPr>
-          <p:cNvSpPr>
-            <a:spLocks noGrp="1"/>
-          </p:cNvSpPr>
-          <p:nvPr>
-            <p:ph type="ftr" sz="quarter" idx="10"/>
-          </p:nvPr>
-        </p:nvSpPr>
-        <p:spPr>
-          <a:xfrm>
-            <a:off x="4038599" y="6356350"/>
-            <a:ext cx="4593771" cy="365125"/>
-          </a:xfrm>
-        </p:spPr>
-        <p:txBody>
-          <a:bodyPr/>
-          <a:lstStyle/>
-          <a:p>
-            <a:r>
-              <a:rPr lang="en-US" dirty="0"/>
-              <a:t>Michael Ball | UC Berkeley | https://c88c.org | © CC BY-NC-SA</a:t>
+              <a:t>Mutable Functions</a:t>
             </a:r>
           </a:p>
         </p:txBody>
@@ -15196,13 +15401,21 @@
     </p:spTree>
     <p:extLst>
       <p:ext uri="{BB962C8B-B14F-4D97-AF65-F5344CB8AC3E}">
-        <p14:creationId xmlns:p14="http://schemas.microsoft.com/office/powerpoint/2010/main" val="1496581253"/>
+        <p14:creationId xmlns:p14="http://schemas.microsoft.com/office/powerpoint/2010/main" val="3072244520"/>
       </p:ext>
     </p:extLst>
   </p:cSld>
   <p:clrMapOvr>
     <a:masterClrMapping/>
   </p:clrMapOvr>
+  <mc:AlternateContent xmlns:mc="http://schemas.openxmlformats.org/markup-compatibility/2006" xmlns:p14="http://schemas.microsoft.com/office/powerpoint/2010/main">
+    <mc:Choice Requires="p14">
+      <p:transition spd="slow" p14:dur="2000" advTm="109658"/>
+    </mc:Choice>
+    <mc:Fallback xmlns="">
+      <p:transition spd="slow" advTm="109658"/>
+    </mc:Fallback>
+  </mc:AlternateContent>
 </p:sld>
 </file>
 
@@ -15228,7 +15441,7 @@
           <p:cNvPr id="2" name="Title 1">
             <a:extLst>
               <a:ext uri="{FF2B5EF4-FFF2-40B4-BE49-F238E27FC236}">
-                <a16:creationId xmlns:a16="http://schemas.microsoft.com/office/drawing/2014/main" id="{8C91E9BC-1886-6016-1556-58D9445ADEDD}"/>
+                <a16:creationId xmlns:a16="http://schemas.microsoft.com/office/drawing/2014/main" id="{0D223046-645C-9643-8339-A786218BB4F5}"/>
               </a:ext>
             </a:extLst>
           </p:cNvPr>
@@ -15246,7 +15459,7 @@
           <a:p>
             <a:r>
               <a:rPr lang="en-US" dirty="0"/>
-              <a:t>Making Functions that Capture and change state</a:t>
+              <a:t>Learning Objectives</a:t>
             </a:r>
           </a:p>
         </p:txBody>
@@ -15256,7 +15469,7 @@
           <p:cNvPr id="3" name="Content Placeholder 2">
             <a:extLst>
               <a:ext uri="{FF2B5EF4-FFF2-40B4-BE49-F238E27FC236}">
-                <a16:creationId xmlns:a16="http://schemas.microsoft.com/office/drawing/2014/main" id="{7655869A-DED7-8B52-1677-036CDC20DB2F}"/>
+                <a16:creationId xmlns:a16="http://schemas.microsoft.com/office/drawing/2014/main" id="{B2D9456D-4CEC-CF41-8620-FC5EDDA27F80}"/>
               </a:ext>
             </a:extLst>
           </p:cNvPr>
@@ -15273,240 +15486,33 @@
           <a:lstStyle/>
           <a:p>
             <a:r>
-              <a:rPr lang="en-US" sz="2000" dirty="0"/>
-              <a:t> We want to make a function, which returns a function that can change the state.</a:t>
-            </a:r>
-          </a:p>
-          <a:p>
-            <a:r>
-              <a:rPr lang="en-US" sz="2000" dirty="0"/>
-              <a:t> </a:t>
-            </a:r>
-            <a:r>
-              <a:rPr lang="en-US" sz="2000" dirty="0">
-                <a:hlinkClick r:id="rId2"/>
-              </a:rPr>
-              <a:t>Python Tutor Link</a:t>
-            </a:r>
-            <a:endParaRPr lang="en-US" sz="2000" dirty="0"/>
-          </a:p>
-          <a:p>
-            <a:pPr marL="0" indent="0">
-              <a:buNone/>
-            </a:pPr>
-            <a:r>
-              <a:rPr lang="en-US" sz="2000" dirty="0">
-                <a:latin typeface="Source Code Pro" panose="020B0509030403020204" pitchFamily="49" charset="77"/>
-              </a:rPr>
-              <a:t>def </a:t>
-            </a:r>
-            <a:r>
-              <a:rPr lang="en-US" sz="2000" dirty="0" err="1">
-                <a:latin typeface="Source Code Pro" panose="020B0509030403020204" pitchFamily="49" charset="77"/>
-              </a:rPr>
-              <a:t>make_counter</a:t>
-            </a:r>
-            <a:r>
-              <a:rPr lang="en-US" sz="2000" dirty="0">
-                <a:latin typeface="Source Code Pro" panose="020B0509030403020204" pitchFamily="49" charset="77"/>
-              </a:rPr>
-              <a:t>():</a:t>
-            </a:r>
-          </a:p>
-          <a:p>
-            <a:pPr marL="0" indent="0">
-              <a:buNone/>
-            </a:pPr>
-            <a:r>
-              <a:rPr lang="en-US" sz="2000" dirty="0">
-                <a:latin typeface="Source Code Pro" panose="020B0509030403020204" pitchFamily="49" charset="77"/>
-              </a:rPr>
-              <a:t>    counter = [0]</a:t>
-            </a:r>
-          </a:p>
-          <a:p>
-            <a:pPr marL="0" indent="0">
-              <a:buNone/>
-            </a:pPr>
-            <a:r>
-              <a:rPr lang="en-US" sz="2000" dirty="0">
-                <a:latin typeface="Source Code Pro" panose="020B0509030403020204" pitchFamily="49" charset="77"/>
-              </a:rPr>
-              <a:t>    def </a:t>
-            </a:r>
-            <a:r>
-              <a:rPr lang="en-US" sz="2000" dirty="0" err="1">
-                <a:latin typeface="Source Code Pro" panose="020B0509030403020204" pitchFamily="49" charset="77"/>
-              </a:rPr>
-              <a:t>count_up</a:t>
-            </a:r>
-            <a:r>
-              <a:rPr lang="en-US" sz="2000" dirty="0">
-                <a:latin typeface="Source Code Pro" panose="020B0509030403020204" pitchFamily="49" charset="77"/>
-              </a:rPr>
-              <a:t>():</a:t>
-            </a:r>
-          </a:p>
-          <a:p>
-            <a:pPr marL="0" indent="0">
-              <a:buNone/>
-            </a:pPr>
-            <a:r>
-              <a:rPr lang="en-US" sz="2000" dirty="0">
-                <a:latin typeface="Source Code Pro" panose="020B0509030403020204" pitchFamily="49" charset="77"/>
-              </a:rPr>
-              <a:t>            counter[0] += 1</a:t>
-            </a:r>
-          </a:p>
-          <a:p>
-            <a:pPr marL="0" indent="0">
-              <a:buNone/>
-            </a:pPr>
-            <a:r>
-              <a:rPr lang="en-US" sz="2000" dirty="0">
-                <a:latin typeface="Source Code Pro" panose="020B0509030403020204" pitchFamily="49" charset="77"/>
-              </a:rPr>
-              <a:t>            return counter</a:t>
-            </a:r>
-          </a:p>
-          <a:p>
-            <a:pPr marL="0" indent="0">
-              <a:buNone/>
-            </a:pPr>
-            <a:r>
-              <a:rPr lang="en-US" sz="2000" dirty="0">
-                <a:latin typeface="Source Code Pro" panose="020B0509030403020204" pitchFamily="49" charset="77"/>
-              </a:rPr>
-              <a:t>    return </a:t>
-            </a:r>
-            <a:r>
-              <a:rPr lang="en-US" sz="2000" dirty="0" err="1">
-                <a:latin typeface="Source Code Pro" panose="020B0509030403020204" pitchFamily="49" charset="77"/>
-              </a:rPr>
-              <a:t>count_up</a:t>
-            </a:r>
-            <a:endParaRPr lang="en-US" sz="2000" dirty="0">
-              <a:latin typeface="Source Code Pro" panose="020B0509030403020204" pitchFamily="49" charset="77"/>
-            </a:endParaRPr>
-          </a:p>
-          <a:p>
-            <a:pPr marL="0" indent="0">
-              <a:buNone/>
-            </a:pPr>
-            <a:r>
-              <a:rPr lang="en-US" sz="2000" dirty="0">
-                <a:latin typeface="Source Code Pro" panose="020B0509030403020204" pitchFamily="49" charset="77"/>
-              </a:rPr>
-              <a:t>    </a:t>
-            </a:r>
-          </a:p>
-          <a:p>
-            <a:pPr marL="0" indent="0">
-              <a:buNone/>
-            </a:pPr>
-            <a:r>
-              <a:rPr lang="en-US" sz="2000" dirty="0">
-                <a:latin typeface="Source Code Pro" panose="020B0509030403020204" pitchFamily="49" charset="77"/>
-              </a:rPr>
-              <a:t>c = </a:t>
-            </a:r>
-            <a:r>
-              <a:rPr lang="en-US" sz="2000" dirty="0" err="1">
-                <a:latin typeface="Source Code Pro" panose="020B0509030403020204" pitchFamily="49" charset="77"/>
-              </a:rPr>
-              <a:t>make_counter</a:t>
-            </a:r>
-            <a:r>
-              <a:rPr lang="en-US" sz="2000" dirty="0">
-                <a:latin typeface="Source Code Pro" panose="020B0509030403020204" pitchFamily="49" charset="77"/>
-              </a:rPr>
-              <a:t>()</a:t>
-            </a:r>
-          </a:p>
-          <a:p>
-            <a:pPr marL="0" indent="0">
-              <a:buNone/>
-            </a:pPr>
-            <a:r>
-              <a:rPr lang="en-US" sz="2000" dirty="0">
-                <a:latin typeface="Source Code Pro" panose="020B0509030403020204" pitchFamily="49" charset="77"/>
-              </a:rPr>
-              <a:t>print(c)</a:t>
-            </a:r>
-          </a:p>
-          <a:p>
-            <a:pPr marL="0" indent="0">
-              <a:buNone/>
-            </a:pPr>
-            <a:r>
-              <a:rPr lang="en-US" sz="2000" dirty="0">
-                <a:latin typeface="Source Code Pro" panose="020B0509030403020204" pitchFamily="49" charset="77"/>
-              </a:rPr>
-              <a:t>c()</a:t>
-            </a:r>
-          </a:p>
-          <a:p>
-            <a:pPr marL="0" indent="0">
-              <a:buNone/>
-            </a:pPr>
-            <a:r>
-              <a:rPr lang="en-US" sz="2000" dirty="0">
-                <a:latin typeface="Source Code Pro" panose="020B0509030403020204" pitchFamily="49" charset="77"/>
-              </a:rPr>
-              <a:t>c()</a:t>
-            </a:r>
-          </a:p>
-          <a:p>
-            <a:pPr marL="0" indent="0">
-              <a:buNone/>
-            </a:pPr>
-            <a:r>
-              <a:rPr lang="en-US" sz="2000" dirty="0">
-                <a:latin typeface="Source Code Pro" panose="020B0509030403020204" pitchFamily="49" charset="77"/>
-              </a:rPr>
-              <a:t>c()</a:t>
-            </a:r>
-          </a:p>
-        </p:txBody>
-      </p:sp>
-      <p:sp>
-        <p:nvSpPr>
-          <p:cNvPr id="4" name="TextBox 3">
+              <a:rPr lang="en-US" dirty="0"/>
+              <a:t> Remember: Each function gets its own new frame</a:t>
+            </a:r>
+          </a:p>
+          <a:p>
+            <a:r>
+              <a:rPr lang="en-US" dirty="0"/>
+              <a:t> Inner functions can access data in the parent environment</a:t>
+            </a:r>
+          </a:p>
+          <a:p>
+            <a:r>
+              <a:rPr lang="en-US" dirty="0"/>
+              <a:t> Use an inner function along with a mutable data type to capture changes</a:t>
+            </a:r>
+          </a:p>
+          <a:p>
+            <a:endParaRPr lang="en-US" dirty="0"/>
+          </a:p>
+        </p:txBody>
+      </p:sp>
+      <p:sp>
+        <p:nvSpPr>
+          <p:cNvPr id="4" name="Footer Placeholder 3">
             <a:extLst>
               <a:ext uri="{FF2B5EF4-FFF2-40B4-BE49-F238E27FC236}">
-                <a16:creationId xmlns:a16="http://schemas.microsoft.com/office/drawing/2014/main" id="{D1D47EE3-530B-8E1F-C571-B403E3722935}"/>
-              </a:ext>
-            </a:extLst>
-          </p:cNvPr>
-          <p:cNvSpPr txBox="1"/>
-          <p:nvPr/>
-        </p:nvSpPr>
-        <p:spPr>
-          <a:xfrm>
-            <a:off x="10373710" y="1198179"/>
-            <a:ext cx="184731" cy="307777"/>
-          </a:xfrm>
-          <a:prstGeom prst="rect">
-            <a:avLst/>
-          </a:prstGeom>
-          <a:noFill/>
-        </p:spPr>
-        <p:txBody>
-          <a:bodyPr wrap="none" rtlCol="0">
-            <a:spAutoFit/>
-          </a:bodyPr>
-          <a:lstStyle/>
-          <a:p>
-            <a:endParaRPr lang="en-US" dirty="0"/>
-          </a:p>
-        </p:txBody>
-      </p:sp>
-      <p:sp>
-        <p:nvSpPr>
-          <p:cNvPr id="5" name="Footer Placeholder 3">
-            <a:extLst>
-              <a:ext uri="{FF2B5EF4-FFF2-40B4-BE49-F238E27FC236}">
-                <a16:creationId xmlns:a16="http://schemas.microsoft.com/office/drawing/2014/main" id="{B34F8B42-DE0C-1241-1182-3FEED3391761}"/>
+                <a16:creationId xmlns:a16="http://schemas.microsoft.com/office/drawing/2014/main" id="{D187F8E2-3471-52E7-427C-273C7DF57DB7}"/>
               </a:ext>
             </a:extLst>
           </p:cNvPr>
@@ -15519,7 +15525,7 @@
         </p:nvSpPr>
         <p:spPr>
           <a:xfrm>
-            <a:off x="4038599" y="6367236"/>
+            <a:off x="4038599" y="6356350"/>
             <a:ext cx="4593771" cy="365125"/>
           </a:xfrm>
         </p:spPr>
@@ -15537,7 +15543,7 @@
     </p:spTree>
     <p:extLst>
       <p:ext uri="{BB962C8B-B14F-4D97-AF65-F5344CB8AC3E}">
-        <p14:creationId xmlns:p14="http://schemas.microsoft.com/office/powerpoint/2010/main" val="3879304398"/>
+        <p14:creationId xmlns:p14="http://schemas.microsoft.com/office/powerpoint/2010/main" val="1496581253"/>
       </p:ext>
     </p:extLst>
   </p:cSld>
@@ -15569,7 +15575,7 @@
           <p:cNvPr id="2" name="Title 1">
             <a:extLst>
               <a:ext uri="{FF2B5EF4-FFF2-40B4-BE49-F238E27FC236}">
-                <a16:creationId xmlns:a16="http://schemas.microsoft.com/office/drawing/2014/main" id="{62DBB959-BFDB-244F-80C9-A56387CB2844}"/>
+                <a16:creationId xmlns:a16="http://schemas.microsoft.com/office/drawing/2014/main" id="{8C91E9BC-1886-6016-1556-58D9445ADEDD}"/>
               </a:ext>
             </a:extLst>
           </p:cNvPr>
@@ -15587,7 +15593,7 @@
           <a:p>
             <a:r>
               <a:rPr lang="en-US" dirty="0"/>
-              <a:t>Functions with Changing State</a:t>
+              <a:t>Making Functions that Capture and change state</a:t>
             </a:r>
           </a:p>
         </p:txBody>
@@ -15597,7 +15603,7 @@
           <p:cNvPr id="3" name="Content Placeholder 2">
             <a:extLst>
               <a:ext uri="{FF2B5EF4-FFF2-40B4-BE49-F238E27FC236}">
-                <a16:creationId xmlns:a16="http://schemas.microsoft.com/office/drawing/2014/main" id="{4C3651E1-AEAB-9447-8CCE-1AE9F84E6BFD}"/>
+                <a16:creationId xmlns:a16="http://schemas.microsoft.com/office/drawing/2014/main" id="{7655869A-DED7-8B52-1677-036CDC20DB2F}"/>
               </a:ext>
             </a:extLst>
           </p:cNvPr>
@@ -15614,99 +15620,240 @@
           <a:lstStyle/>
           <a:p>
             <a:r>
-              <a:rPr lang="en-US" dirty="0"/>
-              <a:t>Goal: Use a function to repeatedly withdraw from a bank account that starts with $100.</a:t>
-            </a:r>
-          </a:p>
-          <a:p>
-            <a:r>
-              <a:rPr lang="en-US" dirty="0"/>
-              <a:t> Build our account: </a:t>
-            </a:r>
-            <a:r>
-              <a:rPr lang="en-US" dirty="0">
+              <a:rPr lang="en-US" sz="2000" dirty="0"/>
+              <a:t> We want to make a function, which returns a function that can change the state.</a:t>
+            </a:r>
+          </a:p>
+          <a:p>
+            <a:r>
+              <a:rPr lang="en-US" sz="2000" dirty="0"/>
+              <a:t> </a:t>
+            </a:r>
+            <a:r>
+              <a:rPr lang="en-US" sz="2000" dirty="0">
+                <a:hlinkClick r:id="rId2"/>
+              </a:rPr>
+              <a:t>Python Tutor Link</a:t>
+            </a:r>
+            <a:endParaRPr lang="en-US" sz="2000" dirty="0"/>
+          </a:p>
+          <a:p>
+            <a:pPr marL="0" indent="0">
+              <a:buNone/>
+            </a:pPr>
+            <a:r>
+              <a:rPr lang="en-US" sz="2000" dirty="0">
                 <a:latin typeface="Source Code Pro" panose="020B0509030403020204" pitchFamily="49" charset="77"/>
               </a:rPr>
-              <a:t>withdraw = </a:t>
-            </a:r>
-            <a:r>
-              <a:rPr lang="en-US" dirty="0" err="1">
+              <a:t>def </a:t>
+            </a:r>
+            <a:r>
+              <a:rPr lang="en-US" sz="2000" dirty="0" err="1">
                 <a:latin typeface="Source Code Pro" panose="020B0509030403020204" pitchFamily="49" charset="77"/>
               </a:rPr>
-              <a:t>make_withdraw_account</a:t>
-            </a:r>
-            <a:r>
-              <a:rPr lang="en-US" dirty="0">
+              <a:t>make_counter</a:t>
+            </a:r>
+            <a:r>
+              <a:rPr lang="en-US" sz="2000" dirty="0">
                 <a:latin typeface="Source Code Pro" panose="020B0509030403020204" pitchFamily="49" charset="77"/>
               </a:rPr>
-              <a:t>(100)</a:t>
-            </a:r>
-          </a:p>
-          <a:p>
-            <a:r>
-              <a:rPr lang="en-US" dirty="0"/>
-              <a:t>First call to the function:</a:t>
-            </a:r>
-          </a:p>
-          <a:p>
-            <a:pPr marL="168771" lvl="1" indent="0">
+              <a:t>():</a:t>
+            </a:r>
+          </a:p>
+          <a:p>
+            <a:pPr marL="0" indent="0">
               <a:buNone/>
             </a:pPr>
             <a:r>
-              <a:rPr lang="en-US" dirty="0">
+              <a:rPr lang="en-US" sz="2000" dirty="0">
                 <a:latin typeface="Source Code Pro" panose="020B0509030403020204" pitchFamily="49" charset="77"/>
               </a:rPr>
-              <a:t>withdraw(25)      # 75</a:t>
-            </a:r>
-          </a:p>
-          <a:p>
-            <a:r>
-              <a:rPr lang="en-US" dirty="0"/>
-              <a:t>Second call to the function:</a:t>
-            </a:r>
-          </a:p>
-          <a:p>
-            <a:pPr marL="168771" lvl="1" indent="0">
+              <a:t>    counter = [0]</a:t>
+            </a:r>
+          </a:p>
+          <a:p>
+            <a:pPr marL="0" indent="0">
               <a:buNone/>
             </a:pPr>
             <a:r>
-              <a:rPr lang="en-US" dirty="0">
+              <a:rPr lang="en-US" sz="2000" dirty="0">
                 <a:latin typeface="Source Code Pro" panose="020B0509030403020204" pitchFamily="49" charset="77"/>
               </a:rPr>
-              <a:t>withdraw(25)      # 50</a:t>
-            </a:r>
-          </a:p>
-          <a:p>
-            <a:r>
-              <a:rPr lang="en-US" dirty="0"/>
-              <a:t>Third call to the function:</a:t>
-            </a:r>
-          </a:p>
-          <a:p>
-            <a:pPr marL="168771" lvl="1" indent="0">
+              <a:t>    def </a:t>
+            </a:r>
+            <a:r>
+              <a:rPr lang="en-US" sz="2000" dirty="0" err="1">
+                <a:latin typeface="Source Code Pro" panose="020B0509030403020204" pitchFamily="49" charset="77"/>
+              </a:rPr>
+              <a:t>count_up</a:t>
+            </a:r>
+            <a:r>
+              <a:rPr lang="en-US" sz="2000" dirty="0">
+                <a:latin typeface="Source Code Pro" panose="020B0509030403020204" pitchFamily="49" charset="77"/>
+              </a:rPr>
+              <a:t>():</a:t>
+            </a:r>
+          </a:p>
+          <a:p>
+            <a:pPr marL="0" indent="0">
               <a:buNone/>
             </a:pPr>
             <a:r>
-              <a:rPr lang="en-US" dirty="0">
+              <a:rPr lang="en-US" sz="2000" dirty="0">
                 <a:latin typeface="Source Code Pro" panose="020B0509030403020204" pitchFamily="49" charset="77"/>
               </a:rPr>
-              <a:t>withdraw(60)      # 'Insufficient funds'</a:t>
+              <a:t>            counter[0] += 1</a:t>
             </a:r>
           </a:p>
           <a:p>
             <a:pPr marL="0" indent="0">
               <a:buNone/>
             </a:pPr>
-            <a:endParaRPr lang="en-US" dirty="0"/>
-          </a:p>
-        </p:txBody>
-      </p:sp>
-      <p:sp>
-        <p:nvSpPr>
-          <p:cNvPr id="4" name="Footer Placeholder 3">
+            <a:r>
+              <a:rPr lang="en-US" sz="2000" dirty="0">
+                <a:latin typeface="Source Code Pro" panose="020B0509030403020204" pitchFamily="49" charset="77"/>
+              </a:rPr>
+              <a:t>            return counter</a:t>
+            </a:r>
+          </a:p>
+          <a:p>
+            <a:pPr marL="0" indent="0">
+              <a:buNone/>
+            </a:pPr>
+            <a:r>
+              <a:rPr lang="en-US" sz="2000" dirty="0">
+                <a:latin typeface="Source Code Pro" panose="020B0509030403020204" pitchFamily="49" charset="77"/>
+              </a:rPr>
+              <a:t>    return </a:t>
+            </a:r>
+            <a:r>
+              <a:rPr lang="en-US" sz="2000" dirty="0" err="1">
+                <a:latin typeface="Source Code Pro" panose="020B0509030403020204" pitchFamily="49" charset="77"/>
+              </a:rPr>
+              <a:t>count_up</a:t>
+            </a:r>
+            <a:endParaRPr lang="en-US" sz="2000" dirty="0">
+              <a:latin typeface="Source Code Pro" panose="020B0509030403020204" pitchFamily="49" charset="77"/>
+            </a:endParaRPr>
+          </a:p>
+          <a:p>
+            <a:pPr marL="0" indent="0">
+              <a:buNone/>
+            </a:pPr>
+            <a:r>
+              <a:rPr lang="en-US" sz="2000" dirty="0">
+                <a:latin typeface="Source Code Pro" panose="020B0509030403020204" pitchFamily="49" charset="77"/>
+              </a:rPr>
+              <a:t>    </a:t>
+            </a:r>
+          </a:p>
+          <a:p>
+            <a:pPr marL="0" indent="0">
+              <a:buNone/>
+            </a:pPr>
+            <a:r>
+              <a:rPr lang="en-US" sz="2000" dirty="0">
+                <a:latin typeface="Source Code Pro" panose="020B0509030403020204" pitchFamily="49" charset="77"/>
+              </a:rPr>
+              <a:t>c = </a:t>
+            </a:r>
+            <a:r>
+              <a:rPr lang="en-US" sz="2000" dirty="0" err="1">
+                <a:latin typeface="Source Code Pro" panose="020B0509030403020204" pitchFamily="49" charset="77"/>
+              </a:rPr>
+              <a:t>make_counter</a:t>
+            </a:r>
+            <a:r>
+              <a:rPr lang="en-US" sz="2000" dirty="0">
+                <a:latin typeface="Source Code Pro" panose="020B0509030403020204" pitchFamily="49" charset="77"/>
+              </a:rPr>
+              <a:t>()</a:t>
+            </a:r>
+          </a:p>
+          <a:p>
+            <a:pPr marL="0" indent="0">
+              <a:buNone/>
+            </a:pPr>
+            <a:r>
+              <a:rPr lang="en-US" sz="2000" dirty="0">
+                <a:latin typeface="Source Code Pro" panose="020B0509030403020204" pitchFamily="49" charset="77"/>
+              </a:rPr>
+              <a:t>print(c)</a:t>
+            </a:r>
+          </a:p>
+          <a:p>
+            <a:pPr marL="0" indent="0">
+              <a:buNone/>
+            </a:pPr>
+            <a:r>
+              <a:rPr lang="en-US" sz="2000" dirty="0">
+                <a:latin typeface="Source Code Pro" panose="020B0509030403020204" pitchFamily="49" charset="77"/>
+              </a:rPr>
+              <a:t>c()</a:t>
+            </a:r>
+          </a:p>
+          <a:p>
+            <a:pPr marL="0" indent="0">
+              <a:buNone/>
+            </a:pPr>
+            <a:r>
+              <a:rPr lang="en-US" sz="2000" dirty="0">
+                <a:latin typeface="Source Code Pro" panose="020B0509030403020204" pitchFamily="49" charset="77"/>
+              </a:rPr>
+              <a:t>c()</a:t>
+            </a:r>
+          </a:p>
+          <a:p>
+            <a:pPr marL="0" indent="0">
+              <a:buNone/>
+            </a:pPr>
+            <a:r>
+              <a:rPr lang="en-US" sz="2000" dirty="0">
+                <a:latin typeface="Source Code Pro" panose="020B0509030403020204" pitchFamily="49" charset="77"/>
+              </a:rPr>
+              <a:t>c()</a:t>
+            </a:r>
+          </a:p>
+        </p:txBody>
+      </p:sp>
+      <p:sp>
+        <p:nvSpPr>
+          <p:cNvPr id="4" name="TextBox 3">
             <a:extLst>
               <a:ext uri="{FF2B5EF4-FFF2-40B4-BE49-F238E27FC236}">
-                <a16:creationId xmlns:a16="http://schemas.microsoft.com/office/drawing/2014/main" id="{2D3C90E9-3933-5CC8-DC29-3FD56A6F0D19}"/>
+                <a16:creationId xmlns:a16="http://schemas.microsoft.com/office/drawing/2014/main" id="{D1D47EE3-530B-8E1F-C571-B403E3722935}"/>
+              </a:ext>
+            </a:extLst>
+          </p:cNvPr>
+          <p:cNvSpPr txBox="1"/>
+          <p:nvPr/>
+        </p:nvSpPr>
+        <p:spPr>
+          <a:xfrm>
+            <a:off x="10373710" y="1198179"/>
+            <a:ext cx="184731" cy="307777"/>
+          </a:xfrm>
+          <a:prstGeom prst="rect">
+            <a:avLst/>
+          </a:prstGeom>
+          <a:noFill/>
+        </p:spPr>
+        <p:txBody>
+          <a:bodyPr wrap="none" rtlCol="0">
+            <a:spAutoFit/>
+          </a:bodyPr>
+          <a:lstStyle/>
+          <a:p>
+            <a:endParaRPr lang="en-US" dirty="0"/>
+          </a:p>
+        </p:txBody>
+      </p:sp>
+      <p:sp>
+        <p:nvSpPr>
+          <p:cNvPr id="5" name="Footer Placeholder 3">
+            <a:extLst>
+              <a:ext uri="{FF2B5EF4-FFF2-40B4-BE49-F238E27FC236}">
+                <a16:creationId xmlns:a16="http://schemas.microsoft.com/office/drawing/2014/main" id="{B34F8B42-DE0C-1241-1182-3FEED3391761}"/>
               </a:ext>
             </a:extLst>
           </p:cNvPr>
@@ -15719,7 +15866,7 @@
         </p:nvSpPr>
         <p:spPr>
           <a:xfrm>
-            <a:off x="4038599" y="6356350"/>
+            <a:off x="4038599" y="6367236"/>
             <a:ext cx="4593771" cy="365125"/>
           </a:xfrm>
         </p:spPr>
@@ -15737,7 +15884,7 @@
     </p:spTree>
     <p:extLst>
       <p:ext uri="{BB962C8B-B14F-4D97-AF65-F5344CB8AC3E}">
-        <p14:creationId xmlns:p14="http://schemas.microsoft.com/office/powerpoint/2010/main" val="3691325347"/>
+        <p14:creationId xmlns:p14="http://schemas.microsoft.com/office/powerpoint/2010/main" val="3879304398"/>
       </p:ext>
     </p:extLst>
   </p:cSld>
@@ -15769,7 +15916,7 @@
           <p:cNvPr id="2" name="Title 1">
             <a:extLst>
               <a:ext uri="{FF2B5EF4-FFF2-40B4-BE49-F238E27FC236}">
-                <a16:creationId xmlns:a16="http://schemas.microsoft.com/office/drawing/2014/main" id="{D679C865-ABEB-0245-B07E-52474CBAF24B}"/>
+                <a16:creationId xmlns:a16="http://schemas.microsoft.com/office/drawing/2014/main" id="{62DBB959-BFDB-244F-80C9-A56387CB2844}"/>
               </a:ext>
             </a:extLst>
           </p:cNvPr>
@@ -15787,7 +15934,7 @@
           <a:p>
             <a:r>
               <a:rPr lang="en-US" dirty="0"/>
-              <a:t>How Do We Implement Bank Accounts?</a:t>
+              <a:t>Functions with Changing State</a:t>
             </a:r>
           </a:p>
         </p:txBody>
@@ -15797,7 +15944,7 @@
           <p:cNvPr id="3" name="Content Placeholder 2">
             <a:extLst>
               <a:ext uri="{FF2B5EF4-FFF2-40B4-BE49-F238E27FC236}">
-                <a16:creationId xmlns:a16="http://schemas.microsoft.com/office/drawing/2014/main" id="{D972FE22-B372-9D41-BBB7-19FBD6E7676B}"/>
+                <a16:creationId xmlns:a16="http://schemas.microsoft.com/office/drawing/2014/main" id="{4C3651E1-AEAB-9447-8CCE-1AE9F84E6BFD}"/>
               </a:ext>
             </a:extLst>
           </p:cNvPr>
@@ -15814,134 +15961,90 @@
           <a:lstStyle/>
           <a:p>
             <a:r>
-              <a:rPr lang="en-US" sz="2400" dirty="0"/>
-              <a:t>A mutable value in the parent frame can maintain the local state for a function.</a:t>
-            </a:r>
-          </a:p>
-          <a:p>
-            <a:r>
-              <a:rPr lang="en-US" sz="2400" dirty="0"/>
-              <a:t> </a:t>
-            </a:r>
-            <a:r>
-              <a:rPr lang="en-US" sz="2400" dirty="0">
+              <a:rPr lang="en-US" dirty="0"/>
+              <a:t>Goal: Use a function to repeatedly withdraw from a bank account that starts with $100.</a:t>
+            </a:r>
+          </a:p>
+          <a:p>
+            <a:r>
+              <a:rPr lang="en-US" dirty="0"/>
+              <a:t> Build our account: </a:t>
+            </a:r>
+            <a:r>
+              <a:rPr lang="en-US" dirty="0">
                 <a:latin typeface="Source Code Pro" panose="020B0509030403020204" pitchFamily="49" charset="77"/>
-                <a:hlinkClick r:id="rId3"/>
-              </a:rPr>
-              <a:t>View in PythonTutor</a:t>
-            </a:r>
-            <a:endParaRPr lang="en-US" sz="2400" dirty="0"/>
+              </a:rPr>
+              <a:t>withdraw = </a:t>
+            </a:r>
+            <a:r>
+              <a:rPr lang="en-US" dirty="0" err="1">
+                <a:latin typeface="Source Code Pro" panose="020B0509030403020204" pitchFamily="49" charset="77"/>
+              </a:rPr>
+              <a:t>make_withdraw_account</a:t>
+            </a:r>
+            <a:r>
+              <a:rPr lang="en-US" dirty="0">
+                <a:latin typeface="Source Code Pro" panose="020B0509030403020204" pitchFamily="49" charset="77"/>
+              </a:rPr>
+              <a:t>(100)</a:t>
+            </a:r>
+          </a:p>
+          <a:p>
+            <a:r>
+              <a:rPr lang="en-US" dirty="0"/>
+              <a:t>First call to the function:</a:t>
+            </a:r>
           </a:p>
           <a:p>
             <a:pPr marL="168771" lvl="1" indent="0">
               <a:buNone/>
             </a:pPr>
             <a:r>
-              <a:rPr lang="en-US" sz="2400" dirty="0">
+              <a:rPr lang="en-US" dirty="0">
                 <a:latin typeface="Source Code Pro" panose="020B0509030403020204" pitchFamily="49" charset="77"/>
               </a:rPr>
-              <a:t>def </a:t>
-            </a:r>
-            <a:r>
-              <a:rPr lang="en-US" sz="2400" dirty="0" err="1">
+              <a:t>withdraw(25)      # 75</a:t>
+            </a:r>
+          </a:p>
+          <a:p>
+            <a:r>
+              <a:rPr lang="en-US" dirty="0"/>
+              <a:t>Second call to the function:</a:t>
+            </a:r>
+          </a:p>
+          <a:p>
+            <a:pPr marL="168771" lvl="1" indent="0">
+              <a:buNone/>
+            </a:pPr>
+            <a:r>
+              <a:rPr lang="en-US" dirty="0">
                 <a:latin typeface="Source Code Pro" panose="020B0509030403020204" pitchFamily="49" charset="77"/>
               </a:rPr>
-              <a:t>make_withdraw_account</a:t>
-            </a:r>
-            <a:r>
-              <a:rPr lang="en-US" sz="2400" dirty="0">
+              <a:t>withdraw(25)      # 50</a:t>
+            </a:r>
+          </a:p>
+          <a:p>
+            <a:r>
+              <a:rPr lang="en-US" dirty="0"/>
+              <a:t>Third call to the function:</a:t>
+            </a:r>
+          </a:p>
+          <a:p>
+            <a:pPr marL="168771" lvl="1" indent="0">
+              <a:buNone/>
+            </a:pPr>
+            <a:r>
+              <a:rPr lang="en-US" dirty="0">
                 <a:latin typeface="Source Code Pro" panose="020B0509030403020204" pitchFamily="49" charset="77"/>
               </a:rPr>
-              <a:t>(initial):</a:t>
-            </a:r>
-          </a:p>
-          <a:p>
-            <a:pPr marL="168771" lvl="1" indent="0">
+              <a:t>withdraw(60)      # 'Insufficient funds'</a:t>
+            </a:r>
+          </a:p>
+          <a:p>
+            <a:pPr marL="0" indent="0">
               <a:buNone/>
             </a:pPr>
-            <a:r>
-              <a:rPr lang="en-US" sz="2400" dirty="0">
-                <a:latin typeface="Source Code Pro" panose="020B0509030403020204" pitchFamily="49" charset="77"/>
-              </a:rPr>
-              <a:t>    balance = [initial]</a:t>
-            </a:r>
-          </a:p>
-          <a:p>
-            <a:pPr marL="168771" lvl="1" indent="0">
-              <a:buNone/>
-            </a:pPr>
-            <a:endParaRPr lang="en-US" sz="2400" dirty="0">
-              <a:latin typeface="Source Code Pro" panose="020B0509030403020204" pitchFamily="49" charset="77"/>
-            </a:endParaRPr>
-          </a:p>
-          <a:p>
-            <a:pPr marL="168771" lvl="1" indent="0">
-              <a:buNone/>
-            </a:pPr>
-            <a:r>
-              <a:rPr lang="en-US" sz="2400" dirty="0">
-                <a:latin typeface="Source Code Pro" panose="020B0509030403020204" pitchFamily="49" charset="77"/>
-              </a:rPr>
-              <a:t>    def withdraw(amount):</a:t>
-            </a:r>
-          </a:p>
-          <a:p>
-            <a:pPr marL="168771" lvl="1" indent="0">
-              <a:buNone/>
-            </a:pPr>
-            <a:r>
-              <a:rPr lang="en-US" sz="2400" dirty="0">
-                <a:latin typeface="Source Code Pro" panose="020B0509030403020204" pitchFamily="49" charset="77"/>
-              </a:rPr>
-              <a:t>        if balance[0] - amount &lt; 0:</a:t>
-            </a:r>
-          </a:p>
-          <a:p>
-            <a:pPr marL="168771" lvl="1" indent="0">
-              <a:buNone/>
-            </a:pPr>
-            <a:r>
-              <a:rPr lang="en-US" sz="2400" dirty="0">
-                <a:latin typeface="Source Code Pro" panose="020B0509030403020204" pitchFamily="49" charset="77"/>
-              </a:rPr>
-              <a:t>            return 'Insufficient funds'</a:t>
-            </a:r>
-          </a:p>
-          <a:p>
-            <a:pPr marL="168771" lvl="1" indent="0">
-              <a:buNone/>
-            </a:pPr>
-            <a:r>
-              <a:rPr lang="en-US" sz="2400" dirty="0">
-                <a:latin typeface="Source Code Pro" panose="020B0509030403020204" pitchFamily="49" charset="77"/>
-              </a:rPr>
-              <a:t>        balance[0] -= amount</a:t>
-            </a:r>
-          </a:p>
-          <a:p>
-            <a:pPr marL="168771" lvl="1" indent="0">
-              <a:buNone/>
-            </a:pPr>
-            <a:r>
-              <a:rPr lang="en-US" sz="2400" dirty="0">
-                <a:latin typeface="Source Code Pro" panose="020B0509030403020204" pitchFamily="49" charset="77"/>
-              </a:rPr>
-              <a:t>        return balance[0]</a:t>
-            </a:r>
-          </a:p>
-          <a:p>
-            <a:pPr marL="168771" lvl="1" indent="0">
-              <a:buNone/>
-            </a:pPr>
-            <a:r>
-              <a:rPr lang="en-US" sz="2400" dirty="0">
-                <a:latin typeface="Source Code Pro" panose="020B0509030403020204" pitchFamily="49" charset="77"/>
-              </a:rPr>
-              <a:t>    return withdraw</a:t>
-            </a:r>
-          </a:p>
-          <a:p>
-            <a:endParaRPr lang="en-US" sz="2400" dirty="0"/>
+            <a:endParaRPr lang="en-US" dirty="0"/>
           </a:p>
         </p:txBody>
       </p:sp>
@@ -15950,7 +16053,7 @@
           <p:cNvPr id="4" name="Footer Placeholder 3">
             <a:extLst>
               <a:ext uri="{FF2B5EF4-FFF2-40B4-BE49-F238E27FC236}">
-                <a16:creationId xmlns:a16="http://schemas.microsoft.com/office/drawing/2014/main" id="{295617FE-4ABE-6B43-1D13-6B9A50633069}"/>
+                <a16:creationId xmlns:a16="http://schemas.microsoft.com/office/drawing/2014/main" id="{2D3C90E9-3933-5CC8-DC29-3FD56A6F0D19}"/>
               </a:ext>
             </a:extLst>
           </p:cNvPr>
@@ -15981,7 +16084,7 @@
     </p:spTree>
     <p:extLst>
       <p:ext uri="{BB962C8B-B14F-4D97-AF65-F5344CB8AC3E}">
-        <p14:creationId xmlns:p14="http://schemas.microsoft.com/office/powerpoint/2010/main" val="3312934450"/>
+        <p14:creationId xmlns:p14="http://schemas.microsoft.com/office/powerpoint/2010/main" val="3691325347"/>
       </p:ext>
     </p:extLst>
   </p:cSld>
@@ -16031,7 +16134,7 @@
           <a:p>
             <a:r>
               <a:rPr lang="en-US" dirty="0"/>
-              <a:t>Implementing Bank Accounts</a:t>
+              <a:t>How Do We Implement Bank Accounts?</a:t>
             </a:r>
           </a:p>
         </p:txBody>
@@ -16063,6 +16166,20 @@
             </a:r>
           </a:p>
           <a:p>
+            <a:r>
+              <a:rPr lang="en-US" sz="2400" dirty="0"/>
+              <a:t> </a:t>
+            </a:r>
+            <a:r>
+              <a:rPr lang="en-US" sz="2400" dirty="0">
+                <a:latin typeface="Source Code Pro" panose="020B0509030403020204" pitchFamily="49" charset="77"/>
+                <a:hlinkClick r:id="rId3"/>
+              </a:rPr>
+              <a:t>View in PythonTutor</a:t>
+            </a:r>
+            <a:endParaRPr lang="en-US" sz="2400" dirty="0"/>
+          </a:p>
+          <a:p>
             <a:pPr marL="168771" lvl="1" indent="0">
               <a:buNone/>
             </a:pPr>
@@ -16171,19 +16288,7 @@
             </a:r>
           </a:p>
           <a:p>
-            <a:pPr marL="168771" lvl="1" indent="0">
-              <a:buNone/>
-            </a:pPr>
-            <a:r>
-              <a:rPr lang="en-US" sz="2400" dirty="0">
-                <a:latin typeface="Source Code Pro" panose="020B0509030403020204" pitchFamily="49" charset="77"/>
-                <a:hlinkClick r:id="rId3"/>
-              </a:rPr>
-              <a:t>View in PythonTutor</a:t>
-            </a:r>
-            <a:endParaRPr lang="en-US" sz="2400" dirty="0">
-              <a:latin typeface="Source Code Pro" panose="020B0509030403020204" pitchFamily="49" charset="77"/>
-            </a:endParaRPr>
+            <a:endParaRPr lang="en-US" sz="2400" dirty="0"/>
           </a:p>
         </p:txBody>
       </p:sp>
@@ -16192,7 +16297,7 @@
           <p:cNvPr id="4" name="Footer Placeholder 3">
             <a:extLst>
               <a:ext uri="{FF2B5EF4-FFF2-40B4-BE49-F238E27FC236}">
-                <a16:creationId xmlns:a16="http://schemas.microsoft.com/office/drawing/2014/main" id="{A3F6F1CC-84FF-6F1B-7F11-C159D4F5A6D6}"/>
+                <a16:creationId xmlns:a16="http://schemas.microsoft.com/office/drawing/2014/main" id="{295617FE-4ABE-6B43-1D13-6B9A50633069}"/>
               </a:ext>
             </a:extLst>
           </p:cNvPr>
@@ -16223,7 +16328,7 @@
     </p:spTree>
     <p:extLst>
       <p:ext uri="{BB962C8B-B14F-4D97-AF65-F5344CB8AC3E}">
-        <p14:creationId xmlns:p14="http://schemas.microsoft.com/office/powerpoint/2010/main" val="1467670401"/>
+        <p14:creationId xmlns:p14="http://schemas.microsoft.com/office/powerpoint/2010/main" val="3312934450"/>
       </p:ext>
     </p:extLst>
   </p:cSld>
@@ -16252,32 +16357,10 @@
       </p:grpSpPr>
       <p:sp>
         <p:nvSpPr>
-          <p:cNvPr id="17411" name="Rectangle 2"/>
-          <p:cNvSpPr>
-            <a:spLocks noGrp="1" noChangeArrowheads="1"/>
-          </p:cNvSpPr>
-          <p:nvPr>
-            <p:ph type="ctrTitle"/>
-          </p:nvPr>
-        </p:nvSpPr>
-        <p:spPr/>
-        <p:txBody>
-          <a:bodyPr/>
-          <a:lstStyle/>
-          <a:p>
-            <a:r>
-              <a:rPr lang="en-US" dirty="0"/>
-              <a:t>Abstract Data Types</a:t>
-            </a:r>
-          </a:p>
-        </p:txBody>
-      </p:sp>
-      <p:sp>
-        <p:nvSpPr>
-          <p:cNvPr id="3" name="Subtitle 2">
+          <p:cNvPr id="2" name="Title 1">
             <a:extLst>
               <a:ext uri="{FF2B5EF4-FFF2-40B4-BE49-F238E27FC236}">
-                <a16:creationId xmlns:a16="http://schemas.microsoft.com/office/drawing/2014/main" id="{816F6A8D-A9BC-9984-0E54-1A55E5D0EE04}"/>
+                <a16:creationId xmlns:a16="http://schemas.microsoft.com/office/drawing/2014/main" id="{D679C865-ABEB-0245-B07E-52474CBAF24B}"/>
               </a:ext>
             </a:extLst>
           </p:cNvPr>
@@ -16285,7 +16368,7 @@
             <a:spLocks noGrp="1"/>
           </p:cNvSpPr>
           <p:nvPr>
-            <p:ph type="subTitle" idx="1"/>
+            <p:ph type="title"/>
           </p:nvPr>
         </p:nvSpPr>
         <p:spPr/>
@@ -16293,28 +16376,207 @@
           <a:bodyPr/>
           <a:lstStyle/>
           <a:p>
-            <a:endParaRPr lang="en-US"/>
+            <a:r>
+              <a:rPr lang="en-US" dirty="0"/>
+              <a:t>Implementing Bank Accounts</a:t>
+            </a:r>
+          </a:p>
+        </p:txBody>
+      </p:sp>
+      <p:sp>
+        <p:nvSpPr>
+          <p:cNvPr id="3" name="Content Placeholder 2">
+            <a:extLst>
+              <a:ext uri="{FF2B5EF4-FFF2-40B4-BE49-F238E27FC236}">
+                <a16:creationId xmlns:a16="http://schemas.microsoft.com/office/drawing/2014/main" id="{D972FE22-B372-9D41-BBB7-19FBD6E7676B}"/>
+              </a:ext>
+            </a:extLst>
+          </p:cNvPr>
+          <p:cNvSpPr>
+            <a:spLocks noGrp="1"/>
+          </p:cNvSpPr>
+          <p:nvPr>
+            <p:ph idx="1"/>
+          </p:nvPr>
+        </p:nvSpPr>
+        <p:spPr/>
+        <p:txBody>
+          <a:bodyPr/>
+          <a:lstStyle/>
+          <a:p>
+            <a:r>
+              <a:rPr lang="en-US" sz="2400" dirty="0"/>
+              <a:t>A mutable value in the parent frame can maintain the local state for a function.</a:t>
+            </a:r>
+          </a:p>
+          <a:p>
+            <a:pPr marL="168771" lvl="1" indent="0">
+              <a:buNone/>
+            </a:pPr>
+            <a:r>
+              <a:rPr lang="en-US" sz="2400" dirty="0">
+                <a:latin typeface="Source Code Pro" panose="020B0509030403020204" pitchFamily="49" charset="77"/>
+              </a:rPr>
+              <a:t>def </a:t>
+            </a:r>
+            <a:r>
+              <a:rPr lang="en-US" sz="2400" dirty="0" err="1">
+                <a:latin typeface="Source Code Pro" panose="020B0509030403020204" pitchFamily="49" charset="77"/>
+              </a:rPr>
+              <a:t>make_withdraw_account</a:t>
+            </a:r>
+            <a:r>
+              <a:rPr lang="en-US" sz="2400" dirty="0">
+                <a:latin typeface="Source Code Pro" panose="020B0509030403020204" pitchFamily="49" charset="77"/>
+              </a:rPr>
+              <a:t>(initial):</a:t>
+            </a:r>
+          </a:p>
+          <a:p>
+            <a:pPr marL="168771" lvl="1" indent="0">
+              <a:buNone/>
+            </a:pPr>
+            <a:r>
+              <a:rPr lang="en-US" sz="2400" dirty="0">
+                <a:latin typeface="Source Code Pro" panose="020B0509030403020204" pitchFamily="49" charset="77"/>
+              </a:rPr>
+              <a:t>    balance = [initial]</a:t>
+            </a:r>
+          </a:p>
+          <a:p>
+            <a:pPr marL="168771" lvl="1" indent="0">
+              <a:buNone/>
+            </a:pPr>
+            <a:endParaRPr lang="en-US" sz="2400" dirty="0">
+              <a:latin typeface="Source Code Pro" panose="020B0509030403020204" pitchFamily="49" charset="77"/>
+            </a:endParaRPr>
+          </a:p>
+          <a:p>
+            <a:pPr marL="168771" lvl="1" indent="0">
+              <a:buNone/>
+            </a:pPr>
+            <a:r>
+              <a:rPr lang="en-US" sz="2400" dirty="0">
+                <a:latin typeface="Source Code Pro" panose="020B0509030403020204" pitchFamily="49" charset="77"/>
+              </a:rPr>
+              <a:t>    def withdraw(amount):</a:t>
+            </a:r>
+          </a:p>
+          <a:p>
+            <a:pPr marL="168771" lvl="1" indent="0">
+              <a:buNone/>
+            </a:pPr>
+            <a:r>
+              <a:rPr lang="en-US" sz="2400" dirty="0">
+                <a:latin typeface="Source Code Pro" panose="020B0509030403020204" pitchFamily="49" charset="77"/>
+              </a:rPr>
+              <a:t>        if balance[0] - amount &lt; 0:</a:t>
+            </a:r>
+          </a:p>
+          <a:p>
+            <a:pPr marL="168771" lvl="1" indent="0">
+              <a:buNone/>
+            </a:pPr>
+            <a:r>
+              <a:rPr lang="en-US" sz="2400" dirty="0">
+                <a:latin typeface="Source Code Pro" panose="020B0509030403020204" pitchFamily="49" charset="77"/>
+              </a:rPr>
+              <a:t>            return 'Insufficient funds'</a:t>
+            </a:r>
+          </a:p>
+          <a:p>
+            <a:pPr marL="168771" lvl="1" indent="0">
+              <a:buNone/>
+            </a:pPr>
+            <a:r>
+              <a:rPr lang="en-US" sz="2400" dirty="0">
+                <a:latin typeface="Source Code Pro" panose="020B0509030403020204" pitchFamily="49" charset="77"/>
+              </a:rPr>
+              <a:t>        balance[0] -= amount</a:t>
+            </a:r>
+          </a:p>
+          <a:p>
+            <a:pPr marL="168771" lvl="1" indent="0">
+              <a:buNone/>
+            </a:pPr>
+            <a:r>
+              <a:rPr lang="en-US" sz="2400" dirty="0">
+                <a:latin typeface="Source Code Pro" panose="020B0509030403020204" pitchFamily="49" charset="77"/>
+              </a:rPr>
+              <a:t>        return balance[0]</a:t>
+            </a:r>
+          </a:p>
+          <a:p>
+            <a:pPr marL="168771" lvl="1" indent="0">
+              <a:buNone/>
+            </a:pPr>
+            <a:r>
+              <a:rPr lang="en-US" sz="2400" dirty="0">
+                <a:latin typeface="Source Code Pro" panose="020B0509030403020204" pitchFamily="49" charset="77"/>
+              </a:rPr>
+              <a:t>    return withdraw</a:t>
+            </a:r>
+          </a:p>
+          <a:p>
+            <a:pPr marL="168771" lvl="1" indent="0">
+              <a:buNone/>
+            </a:pPr>
+            <a:r>
+              <a:rPr lang="en-US" sz="2400" dirty="0">
+                <a:latin typeface="Source Code Pro" panose="020B0509030403020204" pitchFamily="49" charset="77"/>
+                <a:hlinkClick r:id="rId3"/>
+              </a:rPr>
+              <a:t>View in PythonTutor</a:t>
+            </a:r>
+            <a:endParaRPr lang="en-US" sz="2400" dirty="0">
+              <a:latin typeface="Source Code Pro" panose="020B0509030403020204" pitchFamily="49" charset="77"/>
+            </a:endParaRPr>
+          </a:p>
+        </p:txBody>
+      </p:sp>
+      <p:sp>
+        <p:nvSpPr>
+          <p:cNvPr id="4" name="Footer Placeholder 3">
+            <a:extLst>
+              <a:ext uri="{FF2B5EF4-FFF2-40B4-BE49-F238E27FC236}">
+                <a16:creationId xmlns:a16="http://schemas.microsoft.com/office/drawing/2014/main" id="{A3F6F1CC-84FF-6F1B-7F11-C159D4F5A6D6}"/>
+              </a:ext>
+            </a:extLst>
+          </p:cNvPr>
+          <p:cNvSpPr>
+            <a:spLocks noGrp="1"/>
+          </p:cNvSpPr>
+          <p:nvPr>
+            <p:ph type="ftr" sz="quarter" idx="10"/>
+          </p:nvPr>
+        </p:nvSpPr>
+        <p:spPr>
+          <a:xfrm>
+            <a:off x="4038599" y="6356350"/>
+            <a:ext cx="4593771" cy="365125"/>
+          </a:xfrm>
+        </p:spPr>
+        <p:txBody>
+          <a:bodyPr/>
+          <a:lstStyle/>
+          <a:p>
+            <a:r>
+              <a:rPr lang="en-US" dirty="0"/>
+              <a:t>Michael Ball | UC Berkeley | https://c88c.org | © CC BY-NC-SA</a:t>
+            </a:r>
           </a:p>
         </p:txBody>
       </p:sp>
     </p:spTree>
     <p:extLst>
       <p:ext uri="{BB962C8B-B14F-4D97-AF65-F5344CB8AC3E}">
-        <p14:creationId xmlns:p14="http://schemas.microsoft.com/office/powerpoint/2010/main" val="4205697439"/>
+        <p14:creationId xmlns:p14="http://schemas.microsoft.com/office/powerpoint/2010/main" val="1467670401"/>
       </p:ext>
     </p:extLst>
   </p:cSld>
   <p:clrMapOvr>
     <a:masterClrMapping/>
   </p:clrMapOvr>
-  <mc:AlternateContent xmlns:mc="http://schemas.openxmlformats.org/markup-compatibility/2006" xmlns:p14="http://schemas.microsoft.com/office/powerpoint/2010/main">
-    <mc:Choice Requires="p14">
-      <p:transition spd="slow" p14:dur="2000" advTm="109658"/>
-    </mc:Choice>
-    <mc:Fallback xmlns="">
-      <p:transition xmlns:p14="http://schemas.microsoft.com/office/powerpoint/2010/main" spd="slow" advTm="109658"/>
-    </mc:Fallback>
-  </mc:AlternateContent>
 </p:sld>
 </file>
 
@@ -16337,10 +16599,32 @@
       </p:grpSpPr>
       <p:sp>
         <p:nvSpPr>
-          <p:cNvPr id="2" name="Title 1">
+          <p:cNvPr id="17411" name="Rectangle 2"/>
+          <p:cNvSpPr>
+            <a:spLocks noGrp="1" noChangeArrowheads="1"/>
+          </p:cNvSpPr>
+          <p:nvPr>
+            <p:ph type="ctrTitle"/>
+          </p:nvPr>
+        </p:nvSpPr>
+        <p:spPr/>
+        <p:txBody>
+          <a:bodyPr/>
+          <a:lstStyle/>
+          <a:p>
+            <a:r>
+              <a:rPr lang="en-US" dirty="0"/>
+              <a:t>Abstract Data Types</a:t>
+            </a:r>
+          </a:p>
+        </p:txBody>
+      </p:sp>
+      <p:sp>
+        <p:nvSpPr>
+          <p:cNvPr id="3" name="Subtitle 2">
             <a:extLst>
               <a:ext uri="{FF2B5EF4-FFF2-40B4-BE49-F238E27FC236}">
-                <a16:creationId xmlns:a16="http://schemas.microsoft.com/office/drawing/2014/main" id="{EB14EB12-0C9F-3746-854D-651CEBFE86CE}"/>
+                <a16:creationId xmlns:a16="http://schemas.microsoft.com/office/drawing/2014/main" id="{816F6A8D-A9BC-9984-0E54-1A55E5D0EE04}"/>
               </a:ext>
             </a:extLst>
           </p:cNvPr>
@@ -16348,7 +16632,7 @@
             <a:spLocks noGrp="1"/>
           </p:cNvSpPr>
           <p:nvPr>
-            <p:ph type="title"/>
+            <p:ph type="subTitle" idx="1"/>
           </p:nvPr>
         </p:nvSpPr>
         <p:spPr/>
@@ -16356,111 +16640,28 @@
           <a:bodyPr/>
           <a:lstStyle/>
           <a:p>
-            <a:r>
-              <a:rPr lang="en-US" sz="3600" dirty="0"/>
-              <a:t>Abstract Data Type</a:t>
-            </a:r>
-          </a:p>
-        </p:txBody>
-      </p:sp>
-      <p:sp>
-        <p:nvSpPr>
-          <p:cNvPr id="3" name="Content Placeholder 2">
-            <a:extLst>
-              <a:ext uri="{FF2B5EF4-FFF2-40B4-BE49-F238E27FC236}">
-                <a16:creationId xmlns:a16="http://schemas.microsoft.com/office/drawing/2014/main" id="{D4238813-95CA-8B45-825F-2253C2678B52}"/>
-              </a:ext>
-            </a:extLst>
-          </p:cNvPr>
-          <p:cNvSpPr>
-            <a:spLocks noGrp="1"/>
-          </p:cNvSpPr>
-          <p:nvPr>
-            <p:ph idx="1"/>
-          </p:nvPr>
-        </p:nvSpPr>
-        <p:spPr/>
-        <p:txBody>
-          <a:bodyPr/>
-          <a:lstStyle/>
-          <a:p>
-            <a:r>
-              <a:rPr lang="en-US" sz="2600" dirty="0"/>
-              <a:t>Uses pure functions to encapsulate some logic as part of a program.</a:t>
-            </a:r>
-          </a:p>
-          <a:p>
-            <a:r>
-              <a:rPr lang="en-US" sz="2600" dirty="0"/>
-              <a:t>We rely of built-in types (int, str, list, </a:t>
-            </a:r>
-            <a:r>
-              <a:rPr lang="en-US" sz="2600" dirty="0" err="1"/>
-              <a:t>etc</a:t>
-            </a:r>
-            <a:r>
-              <a:rPr lang="en-US" sz="2600" dirty="0"/>
-              <a:t>) to build ADTs</a:t>
-            </a:r>
-          </a:p>
-          <a:p>
-            <a:r>
-              <a:rPr lang="en-US" sz="2600" dirty="0"/>
-              <a:t>This is a contrast to object-oriented programming</a:t>
-            </a:r>
-          </a:p>
-          <a:p>
-            <a:pPr lvl="1"/>
-            <a:r>
-              <a:rPr lang="en-US" sz="2600" dirty="0"/>
-              <a:t>Which is coming soon!</a:t>
-            </a:r>
-          </a:p>
-        </p:txBody>
-      </p:sp>
-      <p:sp>
-        <p:nvSpPr>
-          <p:cNvPr id="4" name="Footer Placeholder 3">
-            <a:extLst>
-              <a:ext uri="{FF2B5EF4-FFF2-40B4-BE49-F238E27FC236}">
-                <a16:creationId xmlns:a16="http://schemas.microsoft.com/office/drawing/2014/main" id="{71F20023-3C05-44A2-2927-411AD9620C4A}"/>
-              </a:ext>
-            </a:extLst>
-          </p:cNvPr>
-          <p:cNvSpPr>
-            <a:spLocks noGrp="1"/>
-          </p:cNvSpPr>
-          <p:nvPr>
-            <p:ph type="ftr" sz="quarter" idx="10"/>
-          </p:nvPr>
-        </p:nvSpPr>
-        <p:spPr>
-          <a:xfrm>
-            <a:off x="4038599" y="6356350"/>
-            <a:ext cx="4593771" cy="365125"/>
-          </a:xfrm>
-        </p:spPr>
-        <p:txBody>
-          <a:bodyPr/>
-          <a:lstStyle/>
-          <a:p>
-            <a:r>
-              <a:rPr lang="en-US" dirty="0"/>
-              <a:t>Michael Ball | UC Berkeley | https://c88c.org | © CC BY-NC-SA</a:t>
-            </a:r>
+            <a:endParaRPr lang="en-US"/>
           </a:p>
         </p:txBody>
       </p:sp>
     </p:spTree>
     <p:extLst>
       <p:ext uri="{BB962C8B-B14F-4D97-AF65-F5344CB8AC3E}">
-        <p14:creationId xmlns:p14="http://schemas.microsoft.com/office/powerpoint/2010/main" val="3290418895"/>
+        <p14:creationId xmlns:p14="http://schemas.microsoft.com/office/powerpoint/2010/main" val="4205697439"/>
       </p:ext>
     </p:extLst>
   </p:cSld>
   <p:clrMapOvr>
     <a:masterClrMapping/>
   </p:clrMapOvr>
+  <mc:AlternateContent xmlns:mc="http://schemas.openxmlformats.org/markup-compatibility/2006" xmlns:p14="http://schemas.microsoft.com/office/powerpoint/2010/main">
+    <mc:Choice Requires="p14">
+      <p:transition spd="slow" p14:dur="2000" advTm="109658"/>
+    </mc:Choice>
+    <mc:Fallback xmlns="">
+      <p:transition xmlns:p14="http://schemas.microsoft.com/office/powerpoint/2010/main" spd="slow" advTm="109658"/>
+    </mc:Fallback>
+  </mc:AlternateContent>
 </p:sld>
 </file>
 

</xml_diff>